<commit_message>
update ppp and added heatmap
</commit_message>
<xml_diff>
--- a/humans_demo/Humans.pptx
+++ b/humans_demo/Humans.pptx
@@ -5,7 +5,7 @@
     <p:sldMasterId id="2147483648" r:id="rId1"/>
   </p:sldMasterIdLst>
   <p:notesMasterIdLst>
-    <p:notesMasterId r:id="rId11"/>
+    <p:notesMasterId r:id="rId12"/>
   </p:notesMasterIdLst>
   <p:sldIdLst>
     <p:sldId id="256" r:id="rId2"/>
@@ -15,8 +15,9 @@
     <p:sldId id="262" r:id="rId6"/>
     <p:sldId id="263" r:id="rId7"/>
     <p:sldId id="265" r:id="rId8"/>
-    <p:sldId id="260" r:id="rId9"/>
-    <p:sldId id="261" r:id="rId10"/>
+    <p:sldId id="266" r:id="rId9"/>
+    <p:sldId id="260" r:id="rId10"/>
+    <p:sldId id="261" r:id="rId11"/>
   </p:sldIdLst>
   <p:sldSz cx="12192000" cy="6858000"/>
   <p:notesSz cx="6858000" cy="9144000"/>
@@ -205,7 +206,7 @@
           <a:p>
             <a:fld id="{4337D9E4-563D-44F1-9A6E-5EC8CC1BB23C}" type="datetimeFigureOut">
               <a:rPr lang="en-GB" smtClean="0"/>
-              <a:t>27/03/2019</a:t>
+              <a:t>28/03/2019</a:t>
             </a:fld>
             <a:endParaRPr lang="en-GB"/>
           </a:p>
@@ -709,7 +710,7 @@
           <a:p>
             <a:fld id="{902EFA1F-0188-423F-90C2-2B4BB1ADFD41}" type="datetimeFigureOut">
               <a:rPr lang="en-GB" smtClean="0"/>
-              <a:t>27/03/2019</a:t>
+              <a:t>28/03/2019</a:t>
             </a:fld>
             <a:endParaRPr lang="en-GB"/>
           </a:p>
@@ -909,7 +910,7 @@
           <a:p>
             <a:fld id="{902EFA1F-0188-423F-90C2-2B4BB1ADFD41}" type="datetimeFigureOut">
               <a:rPr lang="en-GB" smtClean="0"/>
-              <a:t>27/03/2019</a:t>
+              <a:t>28/03/2019</a:t>
             </a:fld>
             <a:endParaRPr lang="en-GB"/>
           </a:p>
@@ -1119,7 +1120,7 @@
           <a:p>
             <a:fld id="{902EFA1F-0188-423F-90C2-2B4BB1ADFD41}" type="datetimeFigureOut">
               <a:rPr lang="en-GB" smtClean="0"/>
-              <a:t>27/03/2019</a:t>
+              <a:t>28/03/2019</a:t>
             </a:fld>
             <a:endParaRPr lang="en-GB"/>
           </a:p>
@@ -1319,7 +1320,7 @@
           <a:p>
             <a:fld id="{902EFA1F-0188-423F-90C2-2B4BB1ADFD41}" type="datetimeFigureOut">
               <a:rPr lang="en-GB" smtClean="0"/>
-              <a:t>27/03/2019</a:t>
+              <a:t>28/03/2019</a:t>
             </a:fld>
             <a:endParaRPr lang="en-GB"/>
           </a:p>
@@ -1595,7 +1596,7 @@
           <a:p>
             <a:fld id="{902EFA1F-0188-423F-90C2-2B4BB1ADFD41}" type="datetimeFigureOut">
               <a:rPr lang="en-GB" smtClean="0"/>
-              <a:t>27/03/2019</a:t>
+              <a:t>28/03/2019</a:t>
             </a:fld>
             <a:endParaRPr lang="en-GB"/>
           </a:p>
@@ -1863,7 +1864,7 @@
           <a:p>
             <a:fld id="{902EFA1F-0188-423F-90C2-2B4BB1ADFD41}" type="datetimeFigureOut">
               <a:rPr lang="en-GB" smtClean="0"/>
-              <a:t>27/03/2019</a:t>
+              <a:t>28/03/2019</a:t>
             </a:fld>
             <a:endParaRPr lang="en-GB"/>
           </a:p>
@@ -2278,7 +2279,7 @@
           <a:p>
             <a:fld id="{902EFA1F-0188-423F-90C2-2B4BB1ADFD41}" type="datetimeFigureOut">
               <a:rPr lang="en-GB" smtClean="0"/>
-              <a:t>27/03/2019</a:t>
+              <a:t>28/03/2019</a:t>
             </a:fld>
             <a:endParaRPr lang="en-GB"/>
           </a:p>
@@ -2420,7 +2421,7 @@
           <a:p>
             <a:fld id="{902EFA1F-0188-423F-90C2-2B4BB1ADFD41}" type="datetimeFigureOut">
               <a:rPr lang="en-GB" smtClean="0"/>
-              <a:t>27/03/2019</a:t>
+              <a:t>28/03/2019</a:t>
             </a:fld>
             <a:endParaRPr lang="en-GB"/>
           </a:p>
@@ -2533,7 +2534,7 @@
           <a:p>
             <a:fld id="{902EFA1F-0188-423F-90C2-2B4BB1ADFD41}" type="datetimeFigureOut">
               <a:rPr lang="en-GB" smtClean="0"/>
-              <a:t>27/03/2019</a:t>
+              <a:t>28/03/2019</a:t>
             </a:fld>
             <a:endParaRPr lang="en-GB"/>
           </a:p>
@@ -2846,7 +2847,7 @@
           <a:p>
             <a:fld id="{902EFA1F-0188-423F-90C2-2B4BB1ADFD41}" type="datetimeFigureOut">
               <a:rPr lang="en-GB" smtClean="0"/>
-              <a:t>27/03/2019</a:t>
+              <a:t>28/03/2019</a:t>
             </a:fld>
             <a:endParaRPr lang="en-GB"/>
           </a:p>
@@ -3135,7 +3136,7 @@
           <a:p>
             <a:fld id="{902EFA1F-0188-423F-90C2-2B4BB1ADFD41}" type="datetimeFigureOut">
               <a:rPr lang="en-GB" smtClean="0"/>
-              <a:t>27/03/2019</a:t>
+              <a:t>28/03/2019</a:t>
             </a:fld>
             <a:endParaRPr lang="en-GB"/>
           </a:p>
@@ -3381,7 +3382,7 @@
           <a:p>
             <a:fld id="{902EFA1F-0188-423F-90C2-2B4BB1ADFD41}" type="datetimeFigureOut">
               <a:rPr lang="en-GB" smtClean="0"/>
-              <a:t>27/03/2019</a:t>
+              <a:t>28/03/2019</a:t>
             </a:fld>
             <a:endParaRPr lang="en-GB"/>
           </a:p>
@@ -4156,6 +4157,198 @@
 </p:sld>
 </file>
 
+<file path=ppt/slides/slide10.xml><?xml version="1.0" encoding="utf-8"?>
+<p:sld xmlns:a="http://schemas.openxmlformats.org/drawingml/2006/main" xmlns:r="http://schemas.openxmlformats.org/officeDocument/2006/relationships" xmlns:p="http://schemas.openxmlformats.org/presentationml/2006/main">
+  <p:cSld>
+    <p:spTree>
+      <p:nvGrpSpPr>
+        <p:cNvPr id="1" name=""/>
+        <p:cNvGrpSpPr/>
+        <p:nvPr/>
+      </p:nvGrpSpPr>
+      <p:grpSpPr>
+        <a:xfrm>
+          <a:off x="0" y="0"/>
+          <a:ext cx="0" cy="0"/>
+          <a:chOff x="0" y="0"/>
+          <a:chExt cx="0" cy="0"/>
+        </a:xfrm>
+      </p:grpSpPr>
+      <p:sp>
+        <p:nvSpPr>
+          <p:cNvPr id="2" name="Title 1">
+            <a:extLst>
+              <a:ext uri="{FF2B5EF4-FFF2-40B4-BE49-F238E27FC236}">
+                <a16:creationId xmlns:a16="http://schemas.microsoft.com/office/drawing/2014/main" id="{B8E9CF22-EF95-4693-82AE-748951BB99DF}"/>
+              </a:ext>
+            </a:extLst>
+          </p:cNvPr>
+          <p:cNvSpPr>
+            <a:spLocks noGrp="1"/>
+          </p:cNvSpPr>
+          <p:nvPr>
+            <p:ph type="title"/>
+          </p:nvPr>
+        </p:nvSpPr>
+        <p:spPr/>
+        <p:txBody>
+          <a:bodyPr/>
+          <a:lstStyle/>
+          <a:p>
+            <a:r>
+              <a:rPr lang="en-GB" dirty="0"/>
+              <a:t>Picture Courtesies</a:t>
+            </a:r>
+          </a:p>
+        </p:txBody>
+      </p:sp>
+      <p:sp>
+        <p:nvSpPr>
+          <p:cNvPr id="3" name="Content Placeholder 2">
+            <a:extLst>
+              <a:ext uri="{FF2B5EF4-FFF2-40B4-BE49-F238E27FC236}">
+                <a16:creationId xmlns:a16="http://schemas.microsoft.com/office/drawing/2014/main" id="{21D54F00-8732-43CA-A6D9-4F42BF436DAC}"/>
+              </a:ext>
+            </a:extLst>
+          </p:cNvPr>
+          <p:cNvSpPr>
+            <a:spLocks noGrp="1"/>
+          </p:cNvSpPr>
+          <p:nvPr>
+            <p:ph idx="1"/>
+          </p:nvPr>
+        </p:nvSpPr>
+        <p:spPr/>
+        <p:txBody>
+          <a:bodyPr/>
+          <a:lstStyle/>
+          <a:p>
+            <a:r>
+              <a:rPr lang="en-GB" dirty="0"/>
+              <a:t>title picture: </a:t>
+            </a:r>
+            <a:r>
+              <a:rPr lang="en-GB" dirty="0" err="1"/>
+              <a:t>hairymuseummat</a:t>
+            </a:r>
+            <a:r>
+              <a:rPr lang="en-GB" dirty="0"/>
+              <a:t> </a:t>
+            </a:r>
+            <a:r>
+              <a:rPr lang="en-GB" dirty="0">
+                <a:hlinkClick r:id="rId2"/>
+              </a:rPr>
+              <a:t>https://www.theverge.com/2017/10/9/16448412/neanderthal-stone-age-human-genes-dna-schizophrenia-cholesterol-hair-skin-loneliness</a:t>
+            </a:r>
+            <a:endParaRPr lang="en-GB" dirty="0"/>
+          </a:p>
+          <a:p>
+            <a:r>
+              <a:rPr lang="en-GB" dirty="0"/>
+              <a:t>Neanderthal skeleton:</a:t>
+            </a:r>
+            <a:br>
+              <a:rPr lang="en-GB" dirty="0"/>
+            </a:br>
+            <a:r>
+              <a:rPr lang="en-GB" dirty="0">
+                <a:hlinkClick r:id="rId3"/>
+              </a:rPr>
+              <a:t>Claire Houck</a:t>
+            </a:r>
+            <a:r>
+              <a:rPr lang="en-GB" dirty="0"/>
+              <a:t> from New York City, USA - </a:t>
+            </a:r>
+            <a:r>
+              <a:rPr lang="en-GB" dirty="0">
+                <a:hlinkClick r:id="rId4"/>
+              </a:rPr>
+              <a:t>Neanderthal Skeleton</a:t>
+            </a:r>
+            <a:endParaRPr lang="en-GB" dirty="0"/>
+          </a:p>
+          <a:p>
+            <a:r>
+              <a:rPr lang="en-GB" dirty="0"/>
+              <a:t>geneflow picture: </a:t>
+            </a:r>
+            <a:r>
+              <a:rPr lang="en-GB" dirty="0">
+                <a:hlinkClick r:id="rId5"/>
+              </a:rPr>
+              <a:t>http://news.bbc.co.uk/nol/shared/spl/hi/sci_nat/10/neanderthal/img/neanderthals_786.gif</a:t>
+            </a:r>
+            <a:endParaRPr lang="en-GB" dirty="0"/>
+          </a:p>
+        </p:txBody>
+      </p:sp>
+      <p:sp>
+        <p:nvSpPr>
+          <p:cNvPr id="4" name="Rectangle 3">
+            <a:extLst>
+              <a:ext uri="{FF2B5EF4-FFF2-40B4-BE49-F238E27FC236}">
+                <a16:creationId xmlns:a16="http://schemas.microsoft.com/office/drawing/2014/main" id="{D97BFEEA-3E75-4BA5-8A18-406AD82C98B7}"/>
+              </a:ext>
+            </a:extLst>
+          </p:cNvPr>
+          <p:cNvSpPr/>
+          <p:nvPr/>
+        </p:nvSpPr>
+        <p:spPr>
+          <a:xfrm>
+            <a:off x="11353800" y="0"/>
+            <a:ext cx="838200" cy="6858000"/>
+          </a:xfrm>
+          <a:prstGeom prst="rect">
+            <a:avLst/>
+          </a:prstGeom>
+          <a:solidFill>
+            <a:schemeClr val="tx1">
+              <a:lumMod val="65000"/>
+              <a:lumOff val="35000"/>
+            </a:schemeClr>
+          </a:solidFill>
+        </p:spPr>
+        <p:style>
+          <a:lnRef idx="2">
+            <a:schemeClr val="accent1">
+              <a:shade val="50000"/>
+            </a:schemeClr>
+          </a:lnRef>
+          <a:fillRef idx="1">
+            <a:schemeClr val="accent1"/>
+          </a:fillRef>
+          <a:effectRef idx="0">
+            <a:schemeClr val="accent1"/>
+          </a:effectRef>
+          <a:fontRef idx="minor">
+            <a:schemeClr val="lt1"/>
+          </a:fontRef>
+        </p:style>
+        <p:txBody>
+          <a:bodyPr rtlCol="0" anchor="ctr"/>
+          <a:lstStyle/>
+          <a:p>
+            <a:pPr algn="ctr"/>
+            <a:endParaRPr lang="en-GB"/>
+          </a:p>
+        </p:txBody>
+      </p:sp>
+    </p:spTree>
+    <p:extLst>
+      <p:ext uri="{BB962C8B-B14F-4D97-AF65-F5344CB8AC3E}">
+        <p14:creationId xmlns:p14="http://schemas.microsoft.com/office/powerpoint/2010/main" val="1620086336"/>
+      </p:ext>
+    </p:extLst>
+  </p:cSld>
+  <p:clrMapOvr>
+    <a:masterClrMapping/>
+  </p:clrMapOvr>
+</p:sld>
+</file>
+
 <file path=ppt/slides/slide2.xml><?xml version="1.0" encoding="utf-8"?>
 <p:sld xmlns:a="http://schemas.openxmlformats.org/drawingml/2006/main" xmlns:r="http://schemas.openxmlformats.org/officeDocument/2006/relationships" xmlns:p="http://schemas.openxmlformats.org/presentationml/2006/main">
   <p:cSld>
@@ -6038,61 +6231,46 @@
           <a:p>
             <a:r>
               <a:rPr lang="en-GB" sz="4800" dirty="0"/>
-              <a:t>Our Project</a:t>
-            </a:r>
-          </a:p>
-        </p:txBody>
-      </p:sp>
-      <p:sp>
-        <p:nvSpPr>
-          <p:cNvPr id="3" name="Content Placeholder 2">
-            <a:extLst>
-              <a:ext uri="{FF2B5EF4-FFF2-40B4-BE49-F238E27FC236}">
-                <a16:creationId xmlns:a16="http://schemas.microsoft.com/office/drawing/2014/main" id="{6CCAB206-7674-4C9C-B911-7D91983CD901}"/>
-              </a:ext>
-            </a:extLst>
-          </p:cNvPr>
-          <p:cNvSpPr>
-            <a:spLocks noGrp="1"/>
-          </p:cNvSpPr>
+              <a:t>Genetic Distances</a:t>
+            </a:r>
+          </a:p>
+        </p:txBody>
+      </p:sp>
+      <p:pic>
+        <p:nvPicPr>
+          <p:cNvPr id="10" name="Content Placeholder 9">
+            <a:extLst>
+              <a:ext uri="{FF2B5EF4-FFF2-40B4-BE49-F238E27FC236}">
+                <a16:creationId xmlns:a16="http://schemas.microsoft.com/office/drawing/2014/main" id="{5919CFBC-B260-4467-83F8-37C6A613FB0C}"/>
+              </a:ext>
+            </a:extLst>
+          </p:cNvPr>
+          <p:cNvPicPr>
+            <a:picLocks noGrp="1" noChangeAspect="1"/>
+          </p:cNvPicPr>
           <p:nvPr>
             <p:ph idx="1"/>
           </p:nvPr>
-        </p:nvSpPr>
+        </p:nvPicPr>
+        <p:blipFill>
+          <a:blip r:embed="rId2">
+            <a:extLst>
+              <a:ext uri="{28A0092B-C50C-407E-A947-70E740481C1C}">
+                <a14:useLocalDpi xmlns:a14="http://schemas.microsoft.com/office/drawing/2010/main" val="0"/>
+              </a:ext>
+            </a:extLst>
+          </a:blip>
+          <a:stretch>
+            <a:fillRect/>
+          </a:stretch>
+        </p:blipFill>
         <p:spPr>
           <a:xfrm>
-            <a:off x="563684" y="1627917"/>
-            <a:ext cx="3797807" cy="4351338"/>
+            <a:off x="209981" y="1253330"/>
+            <a:ext cx="5645062" cy="5604669"/>
           </a:xfrm>
         </p:spPr>
-        <p:txBody>
-          <a:bodyPr>
-            <a:normAutofit/>
-          </a:bodyPr>
-          <a:lstStyle/>
-          <a:p>
-            <a:r>
-              <a:rPr lang="en-GB" dirty="0"/>
-              <a:t>202 differences in mtDNA  compared to humans</a:t>
-            </a:r>
-          </a:p>
-          <a:p>
-            <a:r>
-              <a:rPr lang="en-GB" dirty="0"/>
-              <a:t>Probable geneflow from Neanderthals to Humans</a:t>
-            </a:r>
-          </a:p>
-          <a:p>
-            <a:r>
-              <a:rPr lang="en-US" dirty="0"/>
-              <a:t>Gene mixing estimated at 1.15% to 1.3% in autosomes</a:t>
-            </a:r>
-          </a:p>
-          <a:p>
-            <a:endParaRPr lang="en-GB" sz="2000" dirty="0"/>
-          </a:p>
-        </p:txBody>
-      </p:sp>
+      </p:pic>
     </p:spTree>
     <p:extLst>
       <p:ext uri="{BB962C8B-B14F-4D97-AF65-F5344CB8AC3E}">
@@ -6107,6 +6285,86 @@
 </file>
 
 <file path=ppt/slides/slide8.xml><?xml version="1.0" encoding="utf-8"?>
+<p:sld xmlns:a="http://schemas.openxmlformats.org/drawingml/2006/main" xmlns:r="http://schemas.openxmlformats.org/officeDocument/2006/relationships" xmlns:p="http://schemas.openxmlformats.org/presentationml/2006/main">
+  <p:cSld>
+    <p:spTree>
+      <p:nvGrpSpPr>
+        <p:cNvPr id="1" name=""/>
+        <p:cNvGrpSpPr/>
+        <p:nvPr/>
+      </p:nvGrpSpPr>
+      <p:grpSpPr>
+        <a:xfrm>
+          <a:off x="0" y="0"/>
+          <a:ext cx="0" cy="0"/>
+          <a:chOff x="0" y="0"/>
+          <a:chExt cx="0" cy="0"/>
+        </a:xfrm>
+      </p:grpSpPr>
+      <p:sp>
+        <p:nvSpPr>
+          <p:cNvPr id="2" name="Title 1">
+            <a:extLst>
+              <a:ext uri="{FF2B5EF4-FFF2-40B4-BE49-F238E27FC236}">
+                <a16:creationId xmlns:a16="http://schemas.microsoft.com/office/drawing/2014/main" id="{76EA7436-33CA-4F19-B60E-0F2DFF56D5D8}"/>
+              </a:ext>
+            </a:extLst>
+          </p:cNvPr>
+          <p:cNvSpPr>
+            <a:spLocks noGrp="1"/>
+          </p:cNvSpPr>
+          <p:nvPr>
+            <p:ph type="title"/>
+          </p:nvPr>
+        </p:nvSpPr>
+        <p:spPr/>
+        <p:txBody>
+          <a:bodyPr/>
+          <a:lstStyle/>
+          <a:p>
+            <a:endParaRPr lang="en-GB" dirty="0"/>
+          </a:p>
+        </p:txBody>
+      </p:sp>
+      <p:sp>
+        <p:nvSpPr>
+          <p:cNvPr id="3" name="Content Placeholder 2">
+            <a:extLst>
+              <a:ext uri="{FF2B5EF4-FFF2-40B4-BE49-F238E27FC236}">
+                <a16:creationId xmlns:a16="http://schemas.microsoft.com/office/drawing/2014/main" id="{09021D47-F7B3-492B-AA9A-1E13A19FC35D}"/>
+              </a:ext>
+            </a:extLst>
+          </p:cNvPr>
+          <p:cNvSpPr>
+            <a:spLocks noGrp="1"/>
+          </p:cNvSpPr>
+          <p:nvPr>
+            <p:ph idx="1"/>
+          </p:nvPr>
+        </p:nvSpPr>
+        <p:spPr/>
+        <p:txBody>
+          <a:bodyPr/>
+          <a:lstStyle/>
+          <a:p>
+            <a:endParaRPr lang="en-GB" dirty="0"/>
+          </a:p>
+        </p:txBody>
+      </p:sp>
+    </p:spTree>
+    <p:extLst>
+      <p:ext uri="{BB962C8B-B14F-4D97-AF65-F5344CB8AC3E}">
+        <p14:creationId xmlns:p14="http://schemas.microsoft.com/office/powerpoint/2010/main" val="2641172548"/>
+      </p:ext>
+    </p:extLst>
+  </p:cSld>
+  <p:clrMapOvr>
+    <a:masterClrMapping/>
+  </p:clrMapOvr>
+</p:sld>
+</file>
+
+<file path=ppt/slides/slide9.xml><?xml version="1.0" encoding="utf-8"?>
 <p:sld xmlns:a="http://schemas.openxmlformats.org/drawingml/2006/main" xmlns:r="http://schemas.openxmlformats.org/officeDocument/2006/relationships" xmlns:p="http://schemas.openxmlformats.org/presentationml/2006/main">
   <p:cSld>
     <p:spTree>
@@ -6232,198 +6490,6 @@
     <p:extLst>
       <p:ext uri="{BB962C8B-B14F-4D97-AF65-F5344CB8AC3E}">
         <p14:creationId xmlns:p14="http://schemas.microsoft.com/office/powerpoint/2010/main" val="686032156"/>
-      </p:ext>
-    </p:extLst>
-  </p:cSld>
-  <p:clrMapOvr>
-    <a:masterClrMapping/>
-  </p:clrMapOvr>
-</p:sld>
-</file>
-
-<file path=ppt/slides/slide9.xml><?xml version="1.0" encoding="utf-8"?>
-<p:sld xmlns:a="http://schemas.openxmlformats.org/drawingml/2006/main" xmlns:r="http://schemas.openxmlformats.org/officeDocument/2006/relationships" xmlns:p="http://schemas.openxmlformats.org/presentationml/2006/main">
-  <p:cSld>
-    <p:spTree>
-      <p:nvGrpSpPr>
-        <p:cNvPr id="1" name=""/>
-        <p:cNvGrpSpPr/>
-        <p:nvPr/>
-      </p:nvGrpSpPr>
-      <p:grpSpPr>
-        <a:xfrm>
-          <a:off x="0" y="0"/>
-          <a:ext cx="0" cy="0"/>
-          <a:chOff x="0" y="0"/>
-          <a:chExt cx="0" cy="0"/>
-        </a:xfrm>
-      </p:grpSpPr>
-      <p:sp>
-        <p:nvSpPr>
-          <p:cNvPr id="2" name="Title 1">
-            <a:extLst>
-              <a:ext uri="{FF2B5EF4-FFF2-40B4-BE49-F238E27FC236}">
-                <a16:creationId xmlns:a16="http://schemas.microsoft.com/office/drawing/2014/main" id="{B8E9CF22-EF95-4693-82AE-748951BB99DF}"/>
-              </a:ext>
-            </a:extLst>
-          </p:cNvPr>
-          <p:cNvSpPr>
-            <a:spLocks noGrp="1"/>
-          </p:cNvSpPr>
-          <p:nvPr>
-            <p:ph type="title"/>
-          </p:nvPr>
-        </p:nvSpPr>
-        <p:spPr/>
-        <p:txBody>
-          <a:bodyPr/>
-          <a:lstStyle/>
-          <a:p>
-            <a:r>
-              <a:rPr lang="en-GB" dirty="0"/>
-              <a:t>Picture Courtesies</a:t>
-            </a:r>
-          </a:p>
-        </p:txBody>
-      </p:sp>
-      <p:sp>
-        <p:nvSpPr>
-          <p:cNvPr id="3" name="Content Placeholder 2">
-            <a:extLst>
-              <a:ext uri="{FF2B5EF4-FFF2-40B4-BE49-F238E27FC236}">
-                <a16:creationId xmlns:a16="http://schemas.microsoft.com/office/drawing/2014/main" id="{21D54F00-8732-43CA-A6D9-4F42BF436DAC}"/>
-              </a:ext>
-            </a:extLst>
-          </p:cNvPr>
-          <p:cNvSpPr>
-            <a:spLocks noGrp="1"/>
-          </p:cNvSpPr>
-          <p:nvPr>
-            <p:ph idx="1"/>
-          </p:nvPr>
-        </p:nvSpPr>
-        <p:spPr/>
-        <p:txBody>
-          <a:bodyPr/>
-          <a:lstStyle/>
-          <a:p>
-            <a:r>
-              <a:rPr lang="en-GB" dirty="0"/>
-              <a:t>title picture: </a:t>
-            </a:r>
-            <a:r>
-              <a:rPr lang="en-GB" dirty="0" err="1"/>
-              <a:t>hairymuseummat</a:t>
-            </a:r>
-            <a:r>
-              <a:rPr lang="en-GB" dirty="0"/>
-              <a:t> </a:t>
-            </a:r>
-            <a:r>
-              <a:rPr lang="en-GB" dirty="0">
-                <a:hlinkClick r:id="rId2"/>
-              </a:rPr>
-              <a:t>https://www.theverge.com/2017/10/9/16448412/neanderthal-stone-age-human-genes-dna-schizophrenia-cholesterol-hair-skin-loneliness</a:t>
-            </a:r>
-            <a:endParaRPr lang="en-GB" dirty="0"/>
-          </a:p>
-          <a:p>
-            <a:r>
-              <a:rPr lang="en-GB" dirty="0"/>
-              <a:t>Neanderthal skeleton:</a:t>
-            </a:r>
-            <a:br>
-              <a:rPr lang="en-GB" dirty="0"/>
-            </a:br>
-            <a:r>
-              <a:rPr lang="en-GB" dirty="0">
-                <a:hlinkClick r:id="rId3"/>
-              </a:rPr>
-              <a:t>Claire Houck</a:t>
-            </a:r>
-            <a:r>
-              <a:rPr lang="en-GB" dirty="0"/>
-              <a:t> from New York City, USA - </a:t>
-            </a:r>
-            <a:r>
-              <a:rPr lang="en-GB" dirty="0">
-                <a:hlinkClick r:id="rId4"/>
-              </a:rPr>
-              <a:t>Neanderthal Skeleton</a:t>
-            </a:r>
-            <a:endParaRPr lang="en-GB" dirty="0"/>
-          </a:p>
-          <a:p>
-            <a:r>
-              <a:rPr lang="en-GB" dirty="0"/>
-              <a:t>geneflow picture: </a:t>
-            </a:r>
-            <a:r>
-              <a:rPr lang="en-GB" dirty="0">
-                <a:hlinkClick r:id="rId5"/>
-              </a:rPr>
-              <a:t>http://news.bbc.co.uk/nol/shared/spl/hi/sci_nat/10/neanderthal/img/neanderthals_786.gif</a:t>
-            </a:r>
-            <a:endParaRPr lang="en-GB" dirty="0"/>
-          </a:p>
-        </p:txBody>
-      </p:sp>
-      <p:sp>
-        <p:nvSpPr>
-          <p:cNvPr id="4" name="Rectangle 3">
-            <a:extLst>
-              <a:ext uri="{FF2B5EF4-FFF2-40B4-BE49-F238E27FC236}">
-                <a16:creationId xmlns:a16="http://schemas.microsoft.com/office/drawing/2014/main" id="{D97BFEEA-3E75-4BA5-8A18-406AD82C98B7}"/>
-              </a:ext>
-            </a:extLst>
-          </p:cNvPr>
-          <p:cNvSpPr/>
-          <p:nvPr/>
-        </p:nvSpPr>
-        <p:spPr>
-          <a:xfrm>
-            <a:off x="11353800" y="0"/>
-            <a:ext cx="838200" cy="6858000"/>
-          </a:xfrm>
-          <a:prstGeom prst="rect">
-            <a:avLst/>
-          </a:prstGeom>
-          <a:solidFill>
-            <a:schemeClr val="tx1">
-              <a:lumMod val="65000"/>
-              <a:lumOff val="35000"/>
-            </a:schemeClr>
-          </a:solidFill>
-        </p:spPr>
-        <p:style>
-          <a:lnRef idx="2">
-            <a:schemeClr val="accent1">
-              <a:shade val="50000"/>
-            </a:schemeClr>
-          </a:lnRef>
-          <a:fillRef idx="1">
-            <a:schemeClr val="accent1"/>
-          </a:fillRef>
-          <a:effectRef idx="0">
-            <a:schemeClr val="accent1"/>
-          </a:effectRef>
-          <a:fontRef idx="minor">
-            <a:schemeClr val="lt1"/>
-          </a:fontRef>
-        </p:style>
-        <p:txBody>
-          <a:bodyPr rtlCol="0" anchor="ctr"/>
-          <a:lstStyle/>
-          <a:p>
-            <a:pPr algn="ctr"/>
-            <a:endParaRPr lang="en-GB"/>
-          </a:p>
-        </p:txBody>
-      </p:sp>
-    </p:spTree>
-    <p:extLst>
-      <p:ext uri="{BB962C8B-B14F-4D97-AF65-F5344CB8AC3E}">
-        <p14:creationId xmlns:p14="http://schemas.microsoft.com/office/powerpoint/2010/main" val="1620086336"/>
       </p:ext>
     </p:extLst>
   </p:cSld>

</xml_diff>

<commit_message>
final ppp and pdf
</commit_message>
<xml_diff>
--- a/humans_demo/Humans.pptx
+++ b/humans_demo/Humans.pptx
@@ -5,7 +5,7 @@
     <p:sldMasterId id="2147483648" r:id="rId1"/>
   </p:sldMasterIdLst>
   <p:notesMasterIdLst>
-    <p:notesMasterId r:id="rId12"/>
+    <p:notesMasterId r:id="rId16"/>
   </p:notesMasterIdLst>
   <p:sldIdLst>
     <p:sldId id="256" r:id="rId2"/>
@@ -16,8 +16,12 @@
     <p:sldId id="263" r:id="rId7"/>
     <p:sldId id="265" r:id="rId8"/>
     <p:sldId id="266" r:id="rId9"/>
-    <p:sldId id="260" r:id="rId10"/>
-    <p:sldId id="261" r:id="rId11"/>
+    <p:sldId id="267" r:id="rId10"/>
+    <p:sldId id="268" r:id="rId11"/>
+    <p:sldId id="269" r:id="rId12"/>
+    <p:sldId id="271" r:id="rId13"/>
+    <p:sldId id="260" r:id="rId14"/>
+    <p:sldId id="261" r:id="rId15"/>
   </p:sldIdLst>
   <p:sldSz cx="12192000" cy="6858000"/>
   <p:notesSz cx="6858000" cy="9144000"/>
@@ -4258,6 +4262,1019 @@
           <a:chExt cx="0" cy="0"/>
         </a:xfrm>
       </p:grpSpPr>
+      <p:pic>
+        <p:nvPicPr>
+          <p:cNvPr id="7" name="Grafik 6"/>
+          <p:cNvPicPr>
+            <a:picLocks noChangeAspect="1"/>
+          </p:cNvPicPr>
+          <p:nvPr/>
+        </p:nvPicPr>
+        <p:blipFill>
+          <a:blip r:embed="rId2" cstate="print">
+            <a:extLst>
+              <a:ext uri="{28A0092B-C50C-407E-A947-70E740481C1C}">
+                <a14:useLocalDpi xmlns:a14="http://schemas.microsoft.com/office/drawing/2010/main" val="0"/>
+              </a:ext>
+            </a:extLst>
+          </a:blip>
+          <a:stretch>
+            <a:fillRect/>
+          </a:stretch>
+        </p:blipFill>
+        <p:spPr>
+          <a:xfrm>
+            <a:off x="144386" y="-32085"/>
+            <a:ext cx="8975558" cy="2763527"/>
+          </a:xfrm>
+          <a:prstGeom prst="rect">
+            <a:avLst/>
+          </a:prstGeom>
+        </p:spPr>
+      </p:pic>
+      <p:sp>
+        <p:nvSpPr>
+          <p:cNvPr id="8" name="Textfeld 7"/>
+          <p:cNvSpPr txBox="1"/>
+          <p:nvPr/>
+        </p:nvSpPr>
+        <p:spPr>
+          <a:xfrm>
+            <a:off x="0" y="2582313"/>
+            <a:ext cx="9119944" cy="830997"/>
+          </a:xfrm>
+          <a:prstGeom prst="rect">
+            <a:avLst/>
+          </a:prstGeom>
+          <a:noFill/>
+        </p:spPr>
+        <p:txBody>
+          <a:bodyPr wrap="square" rtlCol="0">
+            <a:spAutoFit/>
+          </a:bodyPr>
+          <a:lstStyle/>
+          <a:p>
+            <a:pPr algn="ctr"/>
+            <a:r>
+              <a:rPr lang="de-DE" sz="4800" dirty="0"/>
+              <a:t>[…]</a:t>
+            </a:r>
+          </a:p>
+        </p:txBody>
+      </p:sp>
+      <p:pic>
+        <p:nvPicPr>
+          <p:cNvPr id="9" name="Grafik 8"/>
+          <p:cNvPicPr>
+            <a:picLocks noChangeAspect="1"/>
+          </p:cNvPicPr>
+          <p:nvPr/>
+        </p:nvPicPr>
+        <p:blipFill>
+          <a:blip r:embed="rId3" cstate="print">
+            <a:extLst>
+              <a:ext uri="{28A0092B-C50C-407E-A947-70E740481C1C}">
+                <a14:useLocalDpi xmlns:a14="http://schemas.microsoft.com/office/drawing/2010/main" val="0"/>
+              </a:ext>
+            </a:extLst>
+          </a:blip>
+          <a:stretch>
+            <a:fillRect/>
+          </a:stretch>
+        </p:blipFill>
+        <p:spPr>
+          <a:xfrm>
+            <a:off x="1286383" y="3485464"/>
+            <a:ext cx="9111916" cy="3021422"/>
+          </a:xfrm>
+          <a:prstGeom prst="rect">
+            <a:avLst/>
+          </a:prstGeom>
+        </p:spPr>
+      </p:pic>
+      <p:sp>
+        <p:nvSpPr>
+          <p:cNvPr id="10" name="Rechteck 9"/>
+          <p:cNvSpPr/>
+          <p:nvPr/>
+        </p:nvSpPr>
+        <p:spPr>
+          <a:xfrm>
+            <a:off x="4050637" y="16669"/>
+            <a:ext cx="456323" cy="147637"/>
+          </a:xfrm>
+          <a:prstGeom prst="rect">
+            <a:avLst/>
+          </a:prstGeom>
+          <a:noFill/>
+          <a:ln>
+            <a:solidFill>
+              <a:srgbClr val="FF0000"/>
+            </a:solidFill>
+          </a:ln>
+        </p:spPr>
+        <p:style>
+          <a:lnRef idx="2">
+            <a:schemeClr val="accent1">
+              <a:shade val="50000"/>
+            </a:schemeClr>
+          </a:lnRef>
+          <a:fillRef idx="1">
+            <a:schemeClr val="accent1"/>
+          </a:fillRef>
+          <a:effectRef idx="0">
+            <a:schemeClr val="accent1"/>
+          </a:effectRef>
+          <a:fontRef idx="minor">
+            <a:schemeClr val="lt1"/>
+          </a:fontRef>
+        </p:style>
+        <p:txBody>
+          <a:bodyPr rtlCol="0" anchor="ctr"/>
+          <a:lstStyle/>
+          <a:p>
+            <a:pPr algn="ctr"/>
+            <a:endParaRPr lang="de-DE" dirty="0"/>
+          </a:p>
+        </p:txBody>
+      </p:sp>
+      <p:cxnSp>
+        <p:nvCxnSpPr>
+          <p:cNvPr id="12" name="Gerade Verbindung mit Pfeil 11"/>
+          <p:cNvCxnSpPr/>
+          <p:nvPr/>
+        </p:nvCxnSpPr>
+        <p:spPr>
+          <a:xfrm flipH="1">
+            <a:off x="8543180" y="6038850"/>
+            <a:ext cx="576764" cy="0"/>
+          </a:xfrm>
+          <a:prstGeom prst="straightConnector1">
+            <a:avLst/>
+          </a:prstGeom>
+          <a:ln>
+            <a:solidFill>
+              <a:srgbClr val="FF0000"/>
+            </a:solidFill>
+            <a:tailEnd type="triangle"/>
+          </a:ln>
+        </p:spPr>
+        <p:style>
+          <a:lnRef idx="1">
+            <a:schemeClr val="accent1"/>
+          </a:lnRef>
+          <a:fillRef idx="0">
+            <a:schemeClr val="accent1"/>
+          </a:fillRef>
+          <a:effectRef idx="0">
+            <a:schemeClr val="accent1"/>
+          </a:effectRef>
+          <a:fontRef idx="minor">
+            <a:schemeClr val="tx1"/>
+          </a:fontRef>
+        </p:style>
+      </p:cxnSp>
+      <p:cxnSp>
+        <p:nvCxnSpPr>
+          <p:cNvPr id="13" name="Gerade Verbindung mit Pfeil 12"/>
+          <p:cNvCxnSpPr/>
+          <p:nvPr/>
+        </p:nvCxnSpPr>
+        <p:spPr>
+          <a:xfrm flipH="1">
+            <a:off x="8543180" y="5962644"/>
+            <a:ext cx="576764" cy="0"/>
+          </a:xfrm>
+          <a:prstGeom prst="straightConnector1">
+            <a:avLst/>
+          </a:prstGeom>
+          <a:ln>
+            <a:solidFill>
+              <a:srgbClr val="FF0000"/>
+            </a:solidFill>
+            <a:tailEnd type="triangle"/>
+          </a:ln>
+        </p:spPr>
+        <p:style>
+          <a:lnRef idx="1">
+            <a:schemeClr val="accent1"/>
+          </a:lnRef>
+          <a:fillRef idx="0">
+            <a:schemeClr val="accent1"/>
+          </a:fillRef>
+          <a:effectRef idx="0">
+            <a:schemeClr val="accent1"/>
+          </a:effectRef>
+          <a:fontRef idx="minor">
+            <a:schemeClr val="tx1"/>
+          </a:fontRef>
+        </p:style>
+      </p:cxnSp>
+      <p:cxnSp>
+        <p:nvCxnSpPr>
+          <p:cNvPr id="14" name="Gerade Verbindung mit Pfeil 13"/>
+          <p:cNvCxnSpPr/>
+          <p:nvPr/>
+        </p:nvCxnSpPr>
+        <p:spPr>
+          <a:xfrm flipH="1">
+            <a:off x="7459709" y="4086218"/>
+            <a:ext cx="576764" cy="0"/>
+          </a:xfrm>
+          <a:prstGeom prst="straightConnector1">
+            <a:avLst/>
+          </a:prstGeom>
+          <a:ln>
+            <a:solidFill>
+              <a:srgbClr val="FF0000"/>
+            </a:solidFill>
+            <a:tailEnd type="triangle"/>
+          </a:ln>
+        </p:spPr>
+        <p:style>
+          <a:lnRef idx="1">
+            <a:schemeClr val="accent1"/>
+          </a:lnRef>
+          <a:fillRef idx="0">
+            <a:schemeClr val="accent1"/>
+          </a:fillRef>
+          <a:effectRef idx="0">
+            <a:schemeClr val="accent1"/>
+          </a:effectRef>
+          <a:fontRef idx="minor">
+            <a:schemeClr val="tx1"/>
+          </a:fontRef>
+        </p:style>
+      </p:cxnSp>
+      <p:sp>
+        <p:nvSpPr>
+          <p:cNvPr id="15" name="Textfeld 14"/>
+          <p:cNvSpPr txBox="1"/>
+          <p:nvPr/>
+        </p:nvSpPr>
+        <p:spPr>
+          <a:xfrm>
+            <a:off x="8560060" y="816185"/>
+            <a:ext cx="3487554" cy="2308324"/>
+          </a:xfrm>
+          <a:prstGeom prst="rect">
+            <a:avLst/>
+          </a:prstGeom>
+          <a:noFill/>
+        </p:spPr>
+        <p:txBody>
+          <a:bodyPr wrap="square" rtlCol="0">
+            <a:spAutoFit/>
+          </a:bodyPr>
+          <a:lstStyle/>
+          <a:p>
+            <a:pPr marL="285750" indent="-285750">
+              <a:buFont typeface="Arial" panose="020B0604020202020204" pitchFamily="34" charset="0"/>
+              <a:buChar char="•"/>
+            </a:pPr>
+            <a:r>
+              <a:rPr lang="en-US" sz="2400" dirty="0"/>
+              <a:t>Phylogenetic tree of 206 modern humans and 2 </a:t>
+            </a:r>
+            <a:r>
+              <a:rPr lang="en-US" sz="2400" dirty="0" err="1"/>
+              <a:t>neanderthals</a:t>
+            </a:r>
+            <a:endParaRPr lang="en-US" sz="2400" dirty="0"/>
+          </a:p>
+          <a:p>
+            <a:pPr marL="285750" indent="-285750">
+              <a:buFont typeface="Arial" panose="020B0604020202020204" pitchFamily="34" charset="0"/>
+              <a:buChar char="•"/>
+            </a:pPr>
+            <a:r>
+              <a:rPr lang="en-US" sz="2400" dirty="0" err="1"/>
+              <a:t>neanderthals</a:t>
+            </a:r>
+            <a:r>
+              <a:rPr lang="en-US" sz="2400" dirty="0"/>
+              <a:t> are genetically distant from modern humans</a:t>
+            </a:r>
+            <a:endParaRPr lang="de-DE" sz="2400" dirty="0"/>
+          </a:p>
+        </p:txBody>
+      </p:sp>
+      <p:pic>
+        <p:nvPicPr>
+          <p:cNvPr id="16" name="Grafik 15"/>
+          <p:cNvPicPr>
+            <a:picLocks noChangeAspect="1"/>
+          </p:cNvPicPr>
+          <p:nvPr/>
+        </p:nvPicPr>
+        <p:blipFill>
+          <a:blip r:embed="rId4" cstate="print">
+            <a:extLst>
+              <a:ext uri="{28A0092B-C50C-407E-A947-70E740481C1C}">
+                <a14:useLocalDpi xmlns:a14="http://schemas.microsoft.com/office/drawing/2010/main" val="0"/>
+              </a:ext>
+            </a:extLst>
+          </a:blip>
+          <a:stretch>
+            <a:fillRect/>
+          </a:stretch>
+        </p:blipFill>
+        <p:spPr>
+          <a:xfrm>
+            <a:off x="0" y="4942726"/>
+            <a:ext cx="1664404" cy="1915274"/>
+          </a:xfrm>
+          <a:prstGeom prst="rect">
+            <a:avLst/>
+          </a:prstGeom>
+          <a:ln w="28575">
+            <a:solidFill>
+              <a:schemeClr val="tx1"/>
+            </a:solidFill>
+          </a:ln>
+        </p:spPr>
+      </p:pic>
+      <p:sp>
+        <p:nvSpPr>
+          <p:cNvPr id="17" name="Rechteck 16"/>
+          <p:cNvSpPr/>
+          <p:nvPr/>
+        </p:nvSpPr>
+        <p:spPr>
+          <a:xfrm>
+            <a:off x="-19050" y="4932885"/>
+            <a:ext cx="1700213" cy="370159"/>
+          </a:xfrm>
+          <a:prstGeom prst="rect">
+            <a:avLst/>
+          </a:prstGeom>
+          <a:noFill/>
+          <a:ln w="6350">
+            <a:solidFill>
+              <a:schemeClr val="tx1"/>
+            </a:solidFill>
+            <a:prstDash val="sysDash"/>
+          </a:ln>
+        </p:spPr>
+        <p:style>
+          <a:lnRef idx="2">
+            <a:schemeClr val="accent1">
+              <a:shade val="50000"/>
+            </a:schemeClr>
+          </a:lnRef>
+          <a:fillRef idx="1">
+            <a:schemeClr val="accent1"/>
+          </a:fillRef>
+          <a:effectRef idx="0">
+            <a:schemeClr val="accent1"/>
+          </a:effectRef>
+          <a:fontRef idx="minor">
+            <a:schemeClr val="lt1"/>
+          </a:fontRef>
+        </p:style>
+        <p:txBody>
+          <a:bodyPr rtlCol="0" anchor="ctr"/>
+          <a:lstStyle/>
+          <a:p>
+            <a:pPr algn="ctr"/>
+            <a:endParaRPr lang="de-DE"/>
+          </a:p>
+        </p:txBody>
+      </p:sp>
+      <p:sp>
+        <p:nvSpPr>
+          <p:cNvPr id="18" name="Rechteck 17"/>
+          <p:cNvSpPr/>
+          <p:nvPr/>
+        </p:nvSpPr>
+        <p:spPr>
+          <a:xfrm>
+            <a:off x="0" y="6390147"/>
+            <a:ext cx="1664404" cy="477694"/>
+          </a:xfrm>
+          <a:prstGeom prst="rect">
+            <a:avLst/>
+          </a:prstGeom>
+          <a:noFill/>
+          <a:ln w="6350">
+            <a:solidFill>
+              <a:schemeClr val="tx1"/>
+            </a:solidFill>
+            <a:prstDash val="sysDash"/>
+          </a:ln>
+        </p:spPr>
+        <p:style>
+          <a:lnRef idx="2">
+            <a:schemeClr val="accent1">
+              <a:shade val="50000"/>
+            </a:schemeClr>
+          </a:lnRef>
+          <a:fillRef idx="1">
+            <a:schemeClr val="accent1"/>
+          </a:fillRef>
+          <a:effectRef idx="0">
+            <a:schemeClr val="accent1"/>
+          </a:effectRef>
+          <a:fontRef idx="minor">
+            <a:schemeClr val="lt1"/>
+          </a:fontRef>
+        </p:style>
+        <p:txBody>
+          <a:bodyPr rtlCol="0" anchor="ctr"/>
+          <a:lstStyle/>
+          <a:p>
+            <a:pPr algn="ctr"/>
+            <a:endParaRPr lang="de-DE"/>
+          </a:p>
+        </p:txBody>
+      </p:sp>
+    </p:spTree>
+    <p:extLst>
+      <p:ext uri="{BB962C8B-B14F-4D97-AF65-F5344CB8AC3E}">
+        <p14:creationId xmlns:p14="http://schemas.microsoft.com/office/powerpoint/2010/main" val="2928616866"/>
+      </p:ext>
+    </p:extLst>
+  </p:cSld>
+  <p:clrMapOvr>
+    <a:masterClrMapping/>
+  </p:clrMapOvr>
+</p:sld>
+</file>
+
+<file path=ppt/slides/slide11.xml><?xml version="1.0" encoding="utf-8"?>
+<p:sld xmlns:a="http://schemas.openxmlformats.org/drawingml/2006/main" xmlns:r="http://schemas.openxmlformats.org/officeDocument/2006/relationships" xmlns:p="http://schemas.openxmlformats.org/presentationml/2006/main">
+  <p:cSld>
+    <p:spTree>
+      <p:nvGrpSpPr>
+        <p:cNvPr id="1" name=""/>
+        <p:cNvGrpSpPr/>
+        <p:nvPr/>
+      </p:nvGrpSpPr>
+      <p:grpSpPr>
+        <a:xfrm>
+          <a:off x="0" y="0"/>
+          <a:ext cx="0" cy="0"/>
+          <a:chOff x="0" y="0"/>
+          <a:chExt cx="0" cy="0"/>
+        </a:xfrm>
+      </p:grpSpPr>
+      <p:pic>
+        <p:nvPicPr>
+          <p:cNvPr id="4" name="Grafik 3"/>
+          <p:cNvPicPr>
+            <a:picLocks noChangeAspect="1"/>
+          </p:cNvPicPr>
+          <p:nvPr/>
+        </p:nvPicPr>
+        <p:blipFill>
+          <a:blip r:embed="rId2">
+            <a:extLst>
+              <a:ext uri="{28A0092B-C50C-407E-A947-70E740481C1C}">
+                <a14:useLocalDpi xmlns:a14="http://schemas.microsoft.com/office/drawing/2010/main" val="0"/>
+              </a:ext>
+            </a:extLst>
+          </a:blip>
+          <a:stretch>
+            <a:fillRect/>
+          </a:stretch>
+        </p:blipFill>
+        <p:spPr>
+          <a:xfrm>
+            <a:off x="944880" y="244230"/>
+            <a:ext cx="9742535" cy="6369540"/>
+          </a:xfrm>
+          <a:prstGeom prst="rect">
+            <a:avLst/>
+          </a:prstGeom>
+        </p:spPr>
+      </p:pic>
+    </p:spTree>
+    <p:extLst>
+      <p:ext uri="{BB962C8B-B14F-4D97-AF65-F5344CB8AC3E}">
+        <p14:creationId xmlns:p14="http://schemas.microsoft.com/office/powerpoint/2010/main" val="1077453744"/>
+      </p:ext>
+    </p:extLst>
+  </p:cSld>
+  <p:clrMapOvr>
+    <a:masterClrMapping/>
+  </p:clrMapOvr>
+</p:sld>
+</file>
+
+<file path=ppt/slides/slide12.xml><?xml version="1.0" encoding="utf-8"?>
+<p:sld xmlns:a="http://schemas.openxmlformats.org/drawingml/2006/main" xmlns:r="http://schemas.openxmlformats.org/officeDocument/2006/relationships" xmlns:p="http://schemas.openxmlformats.org/presentationml/2006/main">
+  <p:cSld>
+    <p:spTree>
+      <p:nvGrpSpPr>
+        <p:cNvPr id="1" name=""/>
+        <p:cNvGrpSpPr/>
+        <p:nvPr/>
+      </p:nvGrpSpPr>
+      <p:grpSpPr>
+        <a:xfrm>
+          <a:off x="0" y="0"/>
+          <a:ext cx="0" cy="0"/>
+          <a:chOff x="0" y="0"/>
+          <a:chExt cx="0" cy="0"/>
+        </a:xfrm>
+      </p:grpSpPr>
+      <p:sp>
+        <p:nvSpPr>
+          <p:cNvPr id="9" name="Textfeld 8"/>
+          <p:cNvSpPr txBox="1"/>
+          <p:nvPr/>
+        </p:nvSpPr>
+        <p:spPr>
+          <a:xfrm>
+            <a:off x="426028" y="466235"/>
+            <a:ext cx="5942386" cy="769441"/>
+          </a:xfrm>
+          <a:prstGeom prst="rect">
+            <a:avLst/>
+          </a:prstGeom>
+          <a:noFill/>
+        </p:spPr>
+        <p:txBody>
+          <a:bodyPr wrap="square" rtlCol="0">
+            <a:spAutoFit/>
+          </a:bodyPr>
+          <a:lstStyle/>
+          <a:p>
+            <a:r>
+              <a:rPr lang="de-DE" sz="4400" dirty="0"/>
+              <a:t>Conclusion</a:t>
+            </a:r>
+            <a:endParaRPr lang="de-DE" dirty="0"/>
+          </a:p>
+        </p:txBody>
+      </p:sp>
+      <p:sp>
+        <p:nvSpPr>
+          <p:cNvPr id="10" name="Rectangle 9">
+            <a:extLst>
+              <a:ext uri="{FF2B5EF4-FFF2-40B4-BE49-F238E27FC236}">
+                <a16:creationId xmlns:a16="http://schemas.microsoft.com/office/drawing/2014/main" id="{D0EACB13-BFE7-4925-B768-37FBB86B0CF1}"/>
+              </a:ext>
+            </a:extLst>
+          </p:cNvPr>
+          <p:cNvSpPr/>
+          <p:nvPr/>
+        </p:nvSpPr>
+        <p:spPr>
+          <a:xfrm>
+            <a:off x="11353800" y="0"/>
+            <a:ext cx="838200" cy="6858000"/>
+          </a:xfrm>
+          <a:prstGeom prst="rect">
+            <a:avLst/>
+          </a:prstGeom>
+          <a:solidFill>
+            <a:schemeClr val="tx1">
+              <a:lumMod val="65000"/>
+              <a:lumOff val="35000"/>
+            </a:schemeClr>
+          </a:solidFill>
+        </p:spPr>
+        <p:style>
+          <a:lnRef idx="2">
+            <a:schemeClr val="accent1">
+              <a:shade val="50000"/>
+            </a:schemeClr>
+          </a:lnRef>
+          <a:fillRef idx="1">
+            <a:schemeClr val="accent1"/>
+          </a:fillRef>
+          <a:effectRef idx="0">
+            <a:schemeClr val="accent1"/>
+          </a:effectRef>
+          <a:fontRef idx="minor">
+            <a:schemeClr val="lt1"/>
+          </a:fontRef>
+        </p:style>
+        <p:txBody>
+          <a:bodyPr rtlCol="0" anchor="ctr"/>
+          <a:lstStyle/>
+          <a:p>
+            <a:pPr algn="ctr"/>
+            <a:endParaRPr lang="en-GB"/>
+          </a:p>
+        </p:txBody>
+      </p:sp>
+      <p:cxnSp>
+        <p:nvCxnSpPr>
+          <p:cNvPr id="11" name="Straight Connector 10">
+            <a:extLst>
+              <a:ext uri="{FF2B5EF4-FFF2-40B4-BE49-F238E27FC236}">
+                <a16:creationId xmlns:a16="http://schemas.microsoft.com/office/drawing/2014/main" id="{B82834D1-437B-44D1-8CB6-E48A1012862C}"/>
+              </a:ext>
+            </a:extLst>
+          </p:cNvPr>
+          <p:cNvCxnSpPr>
+            <a:cxnSpLocks/>
+          </p:cNvCxnSpPr>
+          <p:nvPr/>
+        </p:nvCxnSpPr>
+        <p:spPr>
+          <a:xfrm>
+            <a:off x="426028" y="1235676"/>
+            <a:ext cx="4900215" cy="0"/>
+          </a:xfrm>
+          <a:prstGeom prst="line">
+            <a:avLst/>
+          </a:prstGeom>
+          <a:ln w="76200">
+            <a:solidFill>
+              <a:schemeClr val="tx1">
+                <a:lumMod val="50000"/>
+                <a:lumOff val="50000"/>
+              </a:schemeClr>
+            </a:solidFill>
+          </a:ln>
+        </p:spPr>
+        <p:style>
+          <a:lnRef idx="1">
+            <a:schemeClr val="accent1"/>
+          </a:lnRef>
+          <a:fillRef idx="0">
+            <a:schemeClr val="accent1"/>
+          </a:fillRef>
+          <a:effectRef idx="0">
+            <a:schemeClr val="accent1"/>
+          </a:effectRef>
+          <a:fontRef idx="minor">
+            <a:schemeClr val="tx1"/>
+          </a:fontRef>
+        </p:style>
+      </p:cxnSp>
+      <p:sp>
+        <p:nvSpPr>
+          <p:cNvPr id="3" name="TextBox 2">
+            <a:extLst>
+              <a:ext uri="{FF2B5EF4-FFF2-40B4-BE49-F238E27FC236}">
+                <a16:creationId xmlns:a16="http://schemas.microsoft.com/office/drawing/2014/main" id="{BC978768-2FA0-48F2-8053-D24DE0D145E1}"/>
+              </a:ext>
+            </a:extLst>
+          </p:cNvPr>
+          <p:cNvSpPr txBox="1"/>
+          <p:nvPr/>
+        </p:nvSpPr>
+        <p:spPr>
+          <a:xfrm>
+            <a:off x="609600" y="1630680"/>
+            <a:ext cx="10149840" cy="4832092"/>
+          </a:xfrm>
+          <a:prstGeom prst="rect">
+            <a:avLst/>
+          </a:prstGeom>
+          <a:noFill/>
+        </p:spPr>
+        <p:txBody>
+          <a:bodyPr wrap="square" rtlCol="0">
+            <a:spAutoFit/>
+          </a:bodyPr>
+          <a:lstStyle/>
+          <a:p>
+            <a:endParaRPr lang="en-GB" sz="2800" dirty="0"/>
+          </a:p>
+          <a:p>
+            <a:pPr marL="457200" indent="-457200">
+              <a:buFont typeface="Arial" panose="020B0604020202020204" pitchFamily="34" charset="0"/>
+              <a:buChar char="•"/>
+            </a:pPr>
+            <a:r>
+              <a:rPr lang="en-GB" sz="2800" b="1" dirty="0"/>
+              <a:t>Neanderthal</a:t>
+            </a:r>
+            <a:r>
+              <a:rPr lang="en-GB" sz="2800" dirty="0"/>
+              <a:t> closely related to </a:t>
+            </a:r>
+            <a:r>
+              <a:rPr lang="en-GB" sz="2800" b="1" dirty="0"/>
+              <a:t>modern</a:t>
+            </a:r>
+            <a:r>
+              <a:rPr lang="en-GB" sz="2800" dirty="0"/>
+              <a:t> </a:t>
+            </a:r>
+            <a:r>
+              <a:rPr lang="en-GB" sz="2800" b="1" dirty="0"/>
+              <a:t>humans</a:t>
+            </a:r>
+            <a:r>
+              <a:rPr lang="en-GB" sz="2800" dirty="0"/>
+              <a:t>, when compared to other primates</a:t>
+            </a:r>
+          </a:p>
+          <a:p>
+            <a:pPr marL="457200" indent="-457200">
+              <a:buFont typeface="Arial" panose="020B0604020202020204" pitchFamily="34" charset="0"/>
+              <a:buChar char="•"/>
+            </a:pPr>
+            <a:r>
+              <a:rPr lang="en-GB" sz="2800" dirty="0"/>
+              <a:t>The distance between </a:t>
+            </a:r>
+            <a:r>
+              <a:rPr lang="en-GB" sz="2800" b="1" dirty="0"/>
+              <a:t>Neanderthals</a:t>
+            </a:r>
+            <a:r>
+              <a:rPr lang="en-GB" sz="2800" dirty="0"/>
+              <a:t> and </a:t>
+            </a:r>
+            <a:r>
+              <a:rPr lang="en-GB" sz="2800" b="1" dirty="0"/>
+              <a:t>Humans</a:t>
+            </a:r>
+            <a:r>
+              <a:rPr lang="en-GB" sz="2800" dirty="0"/>
+              <a:t> show that they were two different species</a:t>
+            </a:r>
+          </a:p>
+          <a:p>
+            <a:pPr marL="457200" indent="-457200">
+              <a:buFont typeface="Arial" panose="020B0604020202020204" pitchFamily="34" charset="0"/>
+              <a:buChar char="•"/>
+            </a:pPr>
+            <a:r>
+              <a:rPr lang="en-GB" sz="2800" dirty="0"/>
+              <a:t>Our results don’t show weather there was a geneflow between the two species</a:t>
+            </a:r>
+          </a:p>
+          <a:p>
+            <a:pPr marL="457200" indent="-457200">
+              <a:buFont typeface="Arial" panose="020B0604020202020204" pitchFamily="34" charset="0"/>
+              <a:buChar char="•"/>
+            </a:pPr>
+            <a:r>
+              <a:rPr lang="en-GB" sz="2800" dirty="0"/>
+              <a:t>The split-off of Georgians from the other human groups, indicates that there might be inaccurate measurements. This could potentially be fixed by using different distance matrices. </a:t>
+            </a:r>
+          </a:p>
+          <a:p>
+            <a:pPr marL="457200" indent="-457200">
+              <a:buFont typeface="Arial" panose="020B0604020202020204" pitchFamily="34" charset="0"/>
+              <a:buChar char="•"/>
+            </a:pPr>
+            <a:endParaRPr lang="en-GB" sz="2800" dirty="0"/>
+          </a:p>
+        </p:txBody>
+      </p:sp>
+    </p:spTree>
+    <p:extLst>
+      <p:ext uri="{BB962C8B-B14F-4D97-AF65-F5344CB8AC3E}">
+        <p14:creationId xmlns:p14="http://schemas.microsoft.com/office/powerpoint/2010/main" val="3250084118"/>
+      </p:ext>
+    </p:extLst>
+  </p:cSld>
+  <p:clrMapOvr>
+    <a:masterClrMapping/>
+  </p:clrMapOvr>
+</p:sld>
+</file>
+
+<file path=ppt/slides/slide13.xml><?xml version="1.0" encoding="utf-8"?>
+<p:sld xmlns:a="http://schemas.openxmlformats.org/drawingml/2006/main" xmlns:r="http://schemas.openxmlformats.org/officeDocument/2006/relationships" xmlns:p="http://schemas.openxmlformats.org/presentationml/2006/main">
+  <p:cSld>
+    <p:spTree>
+      <p:nvGrpSpPr>
+        <p:cNvPr id="1" name=""/>
+        <p:cNvGrpSpPr/>
+        <p:nvPr/>
+      </p:nvGrpSpPr>
+      <p:grpSpPr>
+        <a:xfrm>
+          <a:off x="0" y="0"/>
+          <a:ext cx="0" cy="0"/>
+          <a:chOff x="0" y="0"/>
+          <a:chExt cx="0" cy="0"/>
+        </a:xfrm>
+      </p:grpSpPr>
+      <p:sp>
+        <p:nvSpPr>
+          <p:cNvPr id="2" name="Title 1">
+            <a:extLst>
+              <a:ext uri="{FF2B5EF4-FFF2-40B4-BE49-F238E27FC236}">
+                <a16:creationId xmlns:a16="http://schemas.microsoft.com/office/drawing/2014/main" id="{1DDA7427-C717-49CC-9361-8F71A094DE37}"/>
+              </a:ext>
+            </a:extLst>
+          </p:cNvPr>
+          <p:cNvSpPr>
+            <a:spLocks noGrp="1"/>
+          </p:cNvSpPr>
+          <p:nvPr>
+            <p:ph type="title"/>
+          </p:nvPr>
+        </p:nvSpPr>
+        <p:spPr/>
+        <p:txBody>
+          <a:bodyPr/>
+          <a:lstStyle/>
+          <a:p>
+            <a:r>
+              <a:rPr lang="en-GB" dirty="0"/>
+              <a:t>References</a:t>
+            </a:r>
+          </a:p>
+        </p:txBody>
+      </p:sp>
+      <p:sp>
+        <p:nvSpPr>
+          <p:cNvPr id="3" name="Content Placeholder 2">
+            <a:extLst>
+              <a:ext uri="{FF2B5EF4-FFF2-40B4-BE49-F238E27FC236}">
+                <a16:creationId xmlns:a16="http://schemas.microsoft.com/office/drawing/2014/main" id="{456D776F-585B-44A1-8F12-F437FC01319C}"/>
+              </a:ext>
+            </a:extLst>
+          </p:cNvPr>
+          <p:cNvSpPr>
+            <a:spLocks noGrp="1"/>
+          </p:cNvSpPr>
+          <p:nvPr>
+            <p:ph idx="1"/>
+          </p:nvPr>
+        </p:nvSpPr>
+        <p:spPr/>
+        <p:txBody>
+          <a:bodyPr>
+            <a:normAutofit/>
+          </a:bodyPr>
+          <a:lstStyle/>
+          <a:p>
+            <a:r>
+              <a:rPr lang="en-GB" sz="2000" dirty="0"/>
+              <a:t>Sriram </a:t>
+            </a:r>
+            <a:r>
+              <a:rPr lang="en-GB" sz="2000" dirty="0" err="1"/>
+              <a:t>Sankararaman</a:t>
+            </a:r>
+            <a:r>
+              <a:rPr lang="en-GB" sz="2000" dirty="0"/>
+              <a:t> et al.: The genomic landscape of Neanderthal ancestry in present-day humans. In: Nature. Band 507, 2014, S. 354–357, doi:10.1038/nature12961</a:t>
+            </a:r>
+          </a:p>
+          <a:p>
+            <a:r>
+              <a:rPr lang="en-GB" sz="2000" dirty="0">
+                <a:hlinkClick r:id="rId2"/>
+              </a:rPr>
+              <a:t>https://www.ncbi.nlm.nih.gov/pubmed/20448178</a:t>
+            </a:r>
+            <a:endParaRPr lang="en-GB" sz="2000" dirty="0"/>
+          </a:p>
+          <a:p>
+            <a:r>
+              <a:rPr lang="en-GB" sz="2000" dirty="0">
+                <a:hlinkClick r:id="rId3"/>
+              </a:rPr>
+              <a:t>https://www.eurekalert.org/pub_releases/2016-02/m-egf021616.php</a:t>
+            </a:r>
+            <a:endParaRPr lang="en-GB" sz="2000" dirty="0"/>
+          </a:p>
+          <a:p>
+            <a:r>
+              <a:rPr lang="en-GB" sz="2000" dirty="0"/>
+              <a:t>Richard E. Green et al.: A Complete Neandertal Mitochondrial Genome Sequence Determined by High-Throughput Sequencing</a:t>
+            </a:r>
+          </a:p>
+          <a:p>
+            <a:r>
+              <a:rPr lang="en-GB" sz="2000" dirty="0"/>
+              <a:t>https://www.theverge.com/2017/10/9/16448412/neanderthal-stone-age-human-genes-dna-schizophrenia-cholesterol-hair-skin-loneliness</a:t>
+            </a:r>
+          </a:p>
+        </p:txBody>
+      </p:sp>
+      <p:sp>
+        <p:nvSpPr>
+          <p:cNvPr id="4" name="Rectangle 3">
+            <a:extLst>
+              <a:ext uri="{FF2B5EF4-FFF2-40B4-BE49-F238E27FC236}">
+                <a16:creationId xmlns:a16="http://schemas.microsoft.com/office/drawing/2014/main" id="{4A5CAE33-1039-4E3C-A59B-F066EA3B96D4}"/>
+              </a:ext>
+            </a:extLst>
+          </p:cNvPr>
+          <p:cNvSpPr/>
+          <p:nvPr/>
+        </p:nvSpPr>
+        <p:spPr>
+          <a:xfrm>
+            <a:off x="11353800" y="0"/>
+            <a:ext cx="838200" cy="6858000"/>
+          </a:xfrm>
+          <a:prstGeom prst="rect">
+            <a:avLst/>
+          </a:prstGeom>
+          <a:solidFill>
+            <a:schemeClr val="tx1">
+              <a:lumMod val="65000"/>
+              <a:lumOff val="35000"/>
+            </a:schemeClr>
+          </a:solidFill>
+        </p:spPr>
+        <p:style>
+          <a:lnRef idx="2">
+            <a:schemeClr val="accent1">
+              <a:shade val="50000"/>
+            </a:schemeClr>
+          </a:lnRef>
+          <a:fillRef idx="1">
+            <a:schemeClr val="accent1"/>
+          </a:fillRef>
+          <a:effectRef idx="0">
+            <a:schemeClr val="accent1"/>
+          </a:effectRef>
+          <a:fontRef idx="minor">
+            <a:schemeClr val="lt1"/>
+          </a:fontRef>
+        </p:style>
+        <p:txBody>
+          <a:bodyPr rtlCol="0" anchor="ctr"/>
+          <a:lstStyle/>
+          <a:p>
+            <a:pPr algn="ctr"/>
+            <a:endParaRPr lang="en-GB"/>
+          </a:p>
+        </p:txBody>
+      </p:sp>
+      <p:cxnSp>
+        <p:nvCxnSpPr>
+          <p:cNvPr id="5" name="Straight Connector 4">
+            <a:extLst>
+              <a:ext uri="{FF2B5EF4-FFF2-40B4-BE49-F238E27FC236}">
+                <a16:creationId xmlns:a16="http://schemas.microsoft.com/office/drawing/2014/main" id="{AD66C3A4-5BB5-4A17-8C8C-3CEBEF9347CA}"/>
+              </a:ext>
+            </a:extLst>
+          </p:cNvPr>
+          <p:cNvCxnSpPr>
+            <a:cxnSpLocks/>
+          </p:cNvCxnSpPr>
+          <p:nvPr/>
+        </p:nvCxnSpPr>
+        <p:spPr>
+          <a:xfrm>
+            <a:off x="951470" y="1482811"/>
+            <a:ext cx="6969211" cy="0"/>
+          </a:xfrm>
+          <a:prstGeom prst="line">
+            <a:avLst/>
+          </a:prstGeom>
+          <a:ln w="76200">
+            <a:solidFill>
+              <a:schemeClr val="tx1">
+                <a:lumMod val="50000"/>
+                <a:lumOff val="50000"/>
+              </a:schemeClr>
+            </a:solidFill>
+          </a:ln>
+        </p:spPr>
+        <p:style>
+          <a:lnRef idx="1">
+            <a:schemeClr val="accent1"/>
+          </a:lnRef>
+          <a:fillRef idx="0">
+            <a:schemeClr val="accent1"/>
+          </a:fillRef>
+          <a:effectRef idx="0">
+            <a:schemeClr val="accent1"/>
+          </a:effectRef>
+          <a:fontRef idx="minor">
+            <a:schemeClr val="tx1"/>
+          </a:fontRef>
+        </p:style>
+      </p:cxnSp>
+    </p:spTree>
+    <p:extLst>
+      <p:ext uri="{BB962C8B-B14F-4D97-AF65-F5344CB8AC3E}">
+        <p14:creationId xmlns:p14="http://schemas.microsoft.com/office/powerpoint/2010/main" val="686032156"/>
+      </p:ext>
+    </p:extLst>
+  </p:cSld>
+  <p:clrMapOvr>
+    <a:masterClrMapping/>
+  </p:clrMapOvr>
+</p:sld>
+</file>
+
+<file path=ppt/slides/slide14.xml><?xml version="1.0" encoding="utf-8"?>
+<p:sld xmlns:a="http://schemas.openxmlformats.org/drawingml/2006/main" xmlns:r="http://schemas.openxmlformats.org/officeDocument/2006/relationships" xmlns:p="http://schemas.openxmlformats.org/presentationml/2006/main">
+  <p:cSld>
+    <p:spTree>
+      <p:nvGrpSpPr>
+        <p:cNvPr id="1" name=""/>
+        <p:cNvGrpSpPr/>
+        <p:nvPr/>
+      </p:nvGrpSpPr>
+      <p:grpSpPr>
+        <a:xfrm>
+          <a:off x="0" y="0"/>
+          <a:ext cx="0" cy="0"/>
+          <a:chOff x="0" y="0"/>
+          <a:chExt cx="0" cy="0"/>
+        </a:xfrm>
+      </p:grpSpPr>
       <p:sp>
         <p:nvSpPr>
           <p:cNvPr id="2" name="Title 1">
@@ -4610,20 +5627,7 @@
             </a:pPr>
             <a:r>
               <a:rPr lang="en-GB" dirty="0"/>
-              <a:t>Experimental procedure</a:t>
-            </a:r>
-          </a:p>
-          <a:p>
-            <a:pPr marL="514350" indent="-514350">
-              <a:lnSpc>
-                <a:spcPct val="170000"/>
-              </a:lnSpc>
-              <a:buFont typeface="+mj-lt"/>
-              <a:buAutoNum type="arabicPeriod" startAt="3"/>
-            </a:pPr>
-            <a:r>
-              <a:rPr lang="en-GB" dirty="0"/>
-              <a:t>Results</a:t>
+              <a:t>Experimental procedure and Results</a:t>
             </a:r>
           </a:p>
           <a:p>
@@ -4801,7 +5805,7 @@
         <p:spPr>
           <a:xfrm>
             <a:off x="615779" y="1732563"/>
-            <a:ext cx="6505575" cy="4351338"/>
+            <a:ext cx="6851821" cy="4351338"/>
           </a:xfrm>
         </p:spPr>
         <p:txBody>
@@ -4810,12 +5814,31 @@
           </a:bodyPr>
           <a:lstStyle/>
           <a:p>
+            <a:pPr>
+              <a:lnSpc>
+                <a:spcPct val="150000"/>
+              </a:lnSpc>
+            </a:pPr>
             <a:r>
               <a:rPr lang="en-US" dirty="0"/>
-              <a:t>Related to Humans</a:t>
-            </a:r>
-          </a:p>
-          <a:p>
+              <a:t>Lived side by side with </a:t>
+            </a:r>
+            <a:r>
+              <a:rPr lang="en-US" i="1" dirty="0"/>
+              <a:t>H. sapiens </a:t>
+            </a:r>
+            <a:r>
+              <a:rPr lang="en-US" dirty="0"/>
+              <a:t>(that’s us)</a:t>
+            </a:r>
+            <a:endParaRPr lang="en-US" i="1" dirty="0"/>
+          </a:p>
+          <a:p>
+            <a:pPr>
+              <a:lnSpc>
+                <a:spcPct val="150000"/>
+              </a:lnSpc>
+            </a:pPr>
             <a:r>
               <a:rPr lang="en-US" dirty="0"/>
               <a:t>Latest common ancestor: </a:t>
@@ -4826,15 +5849,36 @@
             </a:r>
           </a:p>
           <a:p>
+            <a:pPr>
+              <a:lnSpc>
+                <a:spcPct val="150000"/>
+              </a:lnSpc>
+            </a:pPr>
             <a:r>
               <a:rPr lang="en-US" dirty="0"/>
               <a:t>Evolved in Eurasia about 600.000 years ago</a:t>
             </a:r>
           </a:p>
           <a:p>
+            <a:pPr>
+              <a:lnSpc>
+                <a:spcPct val="150000"/>
+              </a:lnSpc>
+            </a:pPr>
             <a:r>
               <a:rPr lang="en-US" dirty="0"/>
               <a:t>Extinction: 30.000 years ago</a:t>
+            </a:r>
+          </a:p>
+          <a:p>
+            <a:pPr>
+              <a:lnSpc>
+                <a:spcPct val="150000"/>
+              </a:lnSpc>
+            </a:pPr>
+            <a:r>
+              <a:rPr lang="en-US" dirty="0"/>
+              <a:t>Related to Humans?</a:t>
             </a:r>
           </a:p>
         </p:txBody>
@@ -7147,108 +8191,145 @@
           <a:chExt cx="0" cy="0"/>
         </a:xfrm>
       </p:grpSpPr>
-      <p:sp>
-        <p:nvSpPr>
-          <p:cNvPr id="2" name="Title 1">
-            <a:extLst>
-              <a:ext uri="{FF2B5EF4-FFF2-40B4-BE49-F238E27FC236}">
-                <a16:creationId xmlns:a16="http://schemas.microsoft.com/office/drawing/2014/main" id="{1DDA7427-C717-49CC-9361-8F71A094DE37}"/>
-              </a:ext>
-            </a:extLst>
-          </p:cNvPr>
-          <p:cNvSpPr>
-            <a:spLocks noGrp="1"/>
-          </p:cNvSpPr>
-          <p:nvPr>
-            <p:ph type="title"/>
-          </p:nvPr>
-        </p:nvSpPr>
-        <p:spPr/>
-        <p:txBody>
-          <a:bodyPr/>
-          <a:lstStyle/>
-          <a:p>
-            <a:r>
-              <a:rPr lang="en-GB" dirty="0"/>
-              <a:t>References</a:t>
-            </a:r>
-          </a:p>
-        </p:txBody>
-      </p:sp>
-      <p:sp>
-        <p:nvSpPr>
-          <p:cNvPr id="3" name="Content Placeholder 2">
-            <a:extLst>
-              <a:ext uri="{FF2B5EF4-FFF2-40B4-BE49-F238E27FC236}">
-                <a16:creationId xmlns:a16="http://schemas.microsoft.com/office/drawing/2014/main" id="{456D776F-585B-44A1-8F12-F437FC01319C}"/>
-              </a:ext>
-            </a:extLst>
-          </p:cNvPr>
-          <p:cNvSpPr>
-            <a:spLocks noGrp="1"/>
-          </p:cNvSpPr>
-          <p:nvPr>
-            <p:ph idx="1"/>
-          </p:nvPr>
-        </p:nvSpPr>
-        <p:spPr/>
-        <p:txBody>
-          <a:bodyPr>
-            <a:normAutofit/>
+      <p:pic>
+        <p:nvPicPr>
+          <p:cNvPr id="5" name="Grafik 4"/>
+          <p:cNvPicPr>
+            <a:picLocks noChangeAspect="1"/>
+          </p:cNvPicPr>
+          <p:nvPr/>
+        </p:nvPicPr>
+        <p:blipFill>
+          <a:blip r:embed="rId2"/>
+          <a:stretch>
+            <a:fillRect/>
+          </a:stretch>
+        </p:blipFill>
+        <p:spPr>
+          <a:xfrm>
+            <a:off x="1790008" y="1425095"/>
+            <a:ext cx="2082726" cy="2035391"/>
+          </a:xfrm>
+          <a:prstGeom prst="rect">
+            <a:avLst/>
+          </a:prstGeom>
+        </p:spPr>
+      </p:pic>
+      <p:pic>
+        <p:nvPicPr>
+          <p:cNvPr id="6" name="Grafik 5"/>
+          <p:cNvPicPr>
+            <a:picLocks noChangeAspect="1"/>
+          </p:cNvPicPr>
+          <p:nvPr/>
+        </p:nvPicPr>
+        <p:blipFill>
+          <a:blip r:embed="rId3"/>
+          <a:stretch>
+            <a:fillRect/>
+          </a:stretch>
+        </p:blipFill>
+        <p:spPr>
+          <a:xfrm>
+            <a:off x="5134840" y="1425096"/>
+            <a:ext cx="3643399" cy="2114071"/>
+          </a:xfrm>
+          <a:prstGeom prst="rect">
+            <a:avLst/>
+          </a:prstGeom>
+        </p:spPr>
+      </p:pic>
+      <p:pic>
+        <p:nvPicPr>
+          <p:cNvPr id="7" name="Grafik 6"/>
+          <p:cNvPicPr>
+            <a:picLocks noChangeAspect="1"/>
+          </p:cNvPicPr>
+          <p:nvPr/>
+        </p:nvPicPr>
+        <p:blipFill>
+          <a:blip r:embed="rId4"/>
+          <a:stretch>
+            <a:fillRect/>
+          </a:stretch>
+        </p:blipFill>
+        <p:spPr>
+          <a:xfrm>
+            <a:off x="1790007" y="3807317"/>
+            <a:ext cx="2615738" cy="2126033"/>
+          </a:xfrm>
+          <a:prstGeom prst="rect">
+            <a:avLst/>
+          </a:prstGeom>
+        </p:spPr>
+      </p:pic>
+      <p:pic>
+        <p:nvPicPr>
+          <p:cNvPr id="8" name="Grafik 7"/>
+          <p:cNvPicPr>
+            <a:picLocks noChangeAspect="1"/>
+          </p:cNvPicPr>
+          <p:nvPr/>
+        </p:nvPicPr>
+        <p:blipFill>
+          <a:blip r:embed="rId5"/>
+          <a:stretch>
+            <a:fillRect/>
+          </a:stretch>
+        </p:blipFill>
+        <p:spPr>
+          <a:xfrm>
+            <a:off x="5134840" y="3732478"/>
+            <a:ext cx="4313267" cy="2200872"/>
+          </a:xfrm>
+          <a:prstGeom prst="rect">
+            <a:avLst/>
+          </a:prstGeom>
+        </p:spPr>
+      </p:pic>
+      <p:sp>
+        <p:nvSpPr>
+          <p:cNvPr id="9" name="Textfeld 8"/>
+          <p:cNvSpPr txBox="1"/>
+          <p:nvPr/>
+        </p:nvSpPr>
+        <p:spPr>
+          <a:xfrm>
+            <a:off x="426028" y="31455"/>
+            <a:ext cx="5942386" cy="1200329"/>
+          </a:xfrm>
+          <a:prstGeom prst="rect">
+            <a:avLst/>
+          </a:prstGeom>
+          <a:noFill/>
+        </p:spPr>
+        <p:txBody>
+          <a:bodyPr wrap="square" rtlCol="0">
+            <a:spAutoFit/>
           </a:bodyPr>
           <a:lstStyle/>
           <a:p>
             <a:r>
-              <a:rPr lang="en-GB" sz="2000" dirty="0"/>
-              <a:t>Sriram </a:t>
-            </a:r>
-            <a:r>
-              <a:rPr lang="en-GB" sz="2000" dirty="0" err="1"/>
-              <a:t>Sankararaman</a:t>
-            </a:r>
-            <a:r>
-              <a:rPr lang="en-GB" sz="2000" dirty="0"/>
-              <a:t> et al.: The genomic landscape of Neanderthal ancestry in present-day humans. In: Nature. Band 507, 2014, S. 354–357, doi:10.1038/nature12961</a:t>
-            </a:r>
-          </a:p>
-          <a:p>
-            <a:r>
-              <a:rPr lang="en-GB" sz="2000" dirty="0">
-                <a:hlinkClick r:id="rId2"/>
-              </a:rPr>
-              <a:t>https://www.ncbi.nlm.nih.gov/pubmed/20448178</a:t>
-            </a:r>
-            <a:endParaRPr lang="en-GB" sz="2000" dirty="0"/>
-          </a:p>
-          <a:p>
-            <a:r>
-              <a:rPr lang="en-GB" sz="2000" dirty="0">
-                <a:hlinkClick r:id="rId3"/>
-              </a:rPr>
-              <a:t>https://www.eurekalert.org/pub_releases/2016-02/m-egf021616.php</a:t>
-            </a:r>
-            <a:endParaRPr lang="en-GB" sz="2000" dirty="0"/>
-          </a:p>
-          <a:p>
-            <a:r>
-              <a:rPr lang="en-GB" sz="2000" dirty="0"/>
-              <a:t>Richard E. Green et al.: A Complete Neandertal Mitochondrial Genome Sequence Determined by High-Throughput Sequencing</a:t>
-            </a:r>
-          </a:p>
-          <a:p>
-            <a:r>
-              <a:rPr lang="en-GB" sz="2000" dirty="0"/>
-              <a:t>https://www.theverge.com/2017/10/9/16448412/neanderthal-stone-age-human-genes-dna-schizophrenia-cholesterol-hair-skin-loneliness</a:t>
-            </a:r>
-          </a:p>
-        </p:txBody>
-      </p:sp>
-      <p:sp>
-        <p:nvSpPr>
-          <p:cNvPr id="4" name="Rectangle 3">
-            <a:extLst>
-              <a:ext uri="{FF2B5EF4-FFF2-40B4-BE49-F238E27FC236}">
-                <a16:creationId xmlns:a16="http://schemas.microsoft.com/office/drawing/2014/main" id="{4A5CAE33-1039-4E3C-A59B-F066EA3B96D4}"/>
+              <a:rPr lang="en-GB" sz="2800" dirty="0"/>
+              <a:t>Experimental procedure</a:t>
+            </a:r>
+            <a:endParaRPr lang="de-DE" sz="2800" dirty="0"/>
+          </a:p>
+          <a:p>
+            <a:r>
+              <a:rPr lang="de-DE" sz="4400" dirty="0"/>
+              <a:t>UPGMA</a:t>
+            </a:r>
+            <a:endParaRPr lang="de-DE" dirty="0"/>
+          </a:p>
+        </p:txBody>
+      </p:sp>
+      <p:sp>
+        <p:nvSpPr>
+          <p:cNvPr id="10" name="Rectangle 9">
+            <a:extLst>
+              <a:ext uri="{FF2B5EF4-FFF2-40B4-BE49-F238E27FC236}">
+                <a16:creationId xmlns:a16="http://schemas.microsoft.com/office/drawing/2014/main" id="{D0EACB13-BFE7-4925-B768-37FBB86B0CF1}"/>
               </a:ext>
             </a:extLst>
           </p:cNvPr>
@@ -7297,10 +8378,10 @@
       </p:sp>
       <p:cxnSp>
         <p:nvCxnSpPr>
-          <p:cNvPr id="5" name="Straight Connector 4">
-            <a:extLst>
-              <a:ext uri="{FF2B5EF4-FFF2-40B4-BE49-F238E27FC236}">
-                <a16:creationId xmlns:a16="http://schemas.microsoft.com/office/drawing/2014/main" id="{AD66C3A4-5BB5-4A17-8C8C-3CEBEF9347CA}"/>
+          <p:cNvPr id="11" name="Straight Connector 10">
+            <a:extLst>
+              <a:ext uri="{FF2B5EF4-FFF2-40B4-BE49-F238E27FC236}">
+                <a16:creationId xmlns:a16="http://schemas.microsoft.com/office/drawing/2014/main" id="{B82834D1-437B-44D1-8CB6-E48A1012862C}"/>
               </a:ext>
             </a:extLst>
           </p:cNvPr>
@@ -7311,8 +8392,8 @@
         </p:nvCxnSpPr>
         <p:spPr>
           <a:xfrm>
-            <a:off x="951470" y="1482811"/>
-            <a:ext cx="6969211" cy="0"/>
+            <a:off x="426028" y="1235676"/>
+            <a:ext cx="4900215" cy="0"/>
           </a:xfrm>
           <a:prstGeom prst="line">
             <a:avLst/>
@@ -7344,7 +8425,7 @@
     </p:spTree>
     <p:extLst>
       <p:ext uri="{BB962C8B-B14F-4D97-AF65-F5344CB8AC3E}">
-        <p14:creationId xmlns:p14="http://schemas.microsoft.com/office/powerpoint/2010/main" val="686032156"/>
+        <p14:creationId xmlns:p14="http://schemas.microsoft.com/office/powerpoint/2010/main" val="1233421875"/>
       </p:ext>
     </p:extLst>
   </p:cSld>

</xml_diff>

<commit_message>
new ppp and pdf
</commit_message>
<xml_diff>
--- a/humans_demo/Humans.pptx
+++ b/humans_demo/Humans.pptx
@@ -17,8 +17,8 @@
     <p:sldId id="265" r:id="rId8"/>
     <p:sldId id="266" r:id="rId9"/>
     <p:sldId id="267" r:id="rId10"/>
-    <p:sldId id="268" r:id="rId11"/>
-    <p:sldId id="269" r:id="rId12"/>
+    <p:sldId id="269" r:id="rId11"/>
+    <p:sldId id="268" r:id="rId12"/>
     <p:sldId id="271" r:id="rId13"/>
     <p:sldId id="260" r:id="rId14"/>
     <p:sldId id="261" r:id="rId15"/>
@@ -210,7 +210,7 @@
           <a:p>
             <a:fld id="{4337D9E4-563D-44F1-9A6E-5EC8CC1BB23C}" type="datetimeFigureOut">
               <a:rPr lang="en-GB" smtClean="0"/>
-              <a:t>28/03/2019</a:t>
+              <a:t>29/03/2019</a:t>
             </a:fld>
             <a:endParaRPr lang="en-GB"/>
           </a:p>
@@ -798,7 +798,7 @@
           <a:p>
             <a:fld id="{902EFA1F-0188-423F-90C2-2B4BB1ADFD41}" type="datetimeFigureOut">
               <a:rPr lang="en-GB" smtClean="0"/>
-              <a:t>28/03/2019</a:t>
+              <a:t>29/03/2019</a:t>
             </a:fld>
             <a:endParaRPr lang="en-GB"/>
           </a:p>
@@ -998,7 +998,7 @@
           <a:p>
             <a:fld id="{902EFA1F-0188-423F-90C2-2B4BB1ADFD41}" type="datetimeFigureOut">
               <a:rPr lang="en-GB" smtClean="0"/>
-              <a:t>28/03/2019</a:t>
+              <a:t>29/03/2019</a:t>
             </a:fld>
             <a:endParaRPr lang="en-GB"/>
           </a:p>
@@ -1208,7 +1208,7 @@
           <a:p>
             <a:fld id="{902EFA1F-0188-423F-90C2-2B4BB1ADFD41}" type="datetimeFigureOut">
               <a:rPr lang="en-GB" smtClean="0"/>
-              <a:t>28/03/2019</a:t>
+              <a:t>29/03/2019</a:t>
             </a:fld>
             <a:endParaRPr lang="en-GB"/>
           </a:p>
@@ -1408,7 +1408,7 @@
           <a:p>
             <a:fld id="{902EFA1F-0188-423F-90C2-2B4BB1ADFD41}" type="datetimeFigureOut">
               <a:rPr lang="en-GB" smtClean="0"/>
-              <a:t>28/03/2019</a:t>
+              <a:t>29/03/2019</a:t>
             </a:fld>
             <a:endParaRPr lang="en-GB"/>
           </a:p>
@@ -1684,7 +1684,7 @@
           <a:p>
             <a:fld id="{902EFA1F-0188-423F-90C2-2B4BB1ADFD41}" type="datetimeFigureOut">
               <a:rPr lang="en-GB" smtClean="0"/>
-              <a:t>28/03/2019</a:t>
+              <a:t>29/03/2019</a:t>
             </a:fld>
             <a:endParaRPr lang="en-GB"/>
           </a:p>
@@ -1952,7 +1952,7 @@
           <a:p>
             <a:fld id="{902EFA1F-0188-423F-90C2-2B4BB1ADFD41}" type="datetimeFigureOut">
               <a:rPr lang="en-GB" smtClean="0"/>
-              <a:t>28/03/2019</a:t>
+              <a:t>29/03/2019</a:t>
             </a:fld>
             <a:endParaRPr lang="en-GB"/>
           </a:p>
@@ -2367,7 +2367,7 @@
           <a:p>
             <a:fld id="{902EFA1F-0188-423F-90C2-2B4BB1ADFD41}" type="datetimeFigureOut">
               <a:rPr lang="en-GB" smtClean="0"/>
-              <a:t>28/03/2019</a:t>
+              <a:t>29/03/2019</a:t>
             </a:fld>
             <a:endParaRPr lang="en-GB"/>
           </a:p>
@@ -2509,7 +2509,7 @@
           <a:p>
             <a:fld id="{902EFA1F-0188-423F-90C2-2B4BB1ADFD41}" type="datetimeFigureOut">
               <a:rPr lang="en-GB" smtClean="0"/>
-              <a:t>28/03/2019</a:t>
+              <a:t>29/03/2019</a:t>
             </a:fld>
             <a:endParaRPr lang="en-GB"/>
           </a:p>
@@ -2622,7 +2622,7 @@
           <a:p>
             <a:fld id="{902EFA1F-0188-423F-90C2-2B4BB1ADFD41}" type="datetimeFigureOut">
               <a:rPr lang="en-GB" smtClean="0"/>
-              <a:t>28/03/2019</a:t>
+              <a:t>29/03/2019</a:t>
             </a:fld>
             <a:endParaRPr lang="en-GB"/>
           </a:p>
@@ -2935,7 +2935,7 @@
           <a:p>
             <a:fld id="{902EFA1F-0188-423F-90C2-2B4BB1ADFD41}" type="datetimeFigureOut">
               <a:rPr lang="en-GB" smtClean="0"/>
-              <a:t>28/03/2019</a:t>
+              <a:t>29/03/2019</a:t>
             </a:fld>
             <a:endParaRPr lang="en-GB"/>
           </a:p>
@@ -3224,7 +3224,7 @@
           <a:p>
             <a:fld id="{902EFA1F-0188-423F-90C2-2B4BB1ADFD41}" type="datetimeFigureOut">
               <a:rPr lang="en-GB" smtClean="0"/>
-              <a:t>28/03/2019</a:t>
+              <a:t>29/03/2019</a:t>
             </a:fld>
             <a:endParaRPr lang="en-GB"/>
           </a:p>
@@ -3470,7 +3470,7 @@
           <a:p>
             <a:fld id="{902EFA1F-0188-423F-90C2-2B4BB1ADFD41}" type="datetimeFigureOut">
               <a:rPr lang="en-GB" smtClean="0"/>
-              <a:t>28/03/2019</a:t>
+              <a:t>29/03/2019</a:t>
             </a:fld>
             <a:endParaRPr lang="en-GB"/>
           </a:p>
@@ -4264,14 +4264,14 @@
       </p:grpSpPr>
       <p:pic>
         <p:nvPicPr>
-          <p:cNvPr id="7" name="Grafik 6"/>
+          <p:cNvPr id="4" name="Grafik 3"/>
           <p:cNvPicPr>
             <a:picLocks noChangeAspect="1"/>
           </p:cNvPicPr>
           <p:nvPr/>
         </p:nvPicPr>
         <p:blipFill>
-          <a:blip r:embed="rId2" cstate="print">
+          <a:blip r:embed="rId2">
             <a:extLst>
               <a:ext uri="{28A0092B-C50C-407E-A947-70E740481C1C}">
                 <a14:useLocalDpi xmlns:a14="http://schemas.microsoft.com/office/drawing/2010/main" val="0"/>
@@ -4284,414 +4284,18 @@
         </p:blipFill>
         <p:spPr>
           <a:xfrm>
-            <a:off x="144386" y="-32085"/>
-            <a:ext cx="8975558" cy="2763527"/>
+            <a:off x="944880" y="244230"/>
+            <a:ext cx="9742535" cy="6369540"/>
           </a:xfrm>
           <a:prstGeom prst="rect">
             <a:avLst/>
           </a:prstGeom>
         </p:spPr>
       </p:pic>
-      <p:sp>
-        <p:nvSpPr>
-          <p:cNvPr id="8" name="Textfeld 7"/>
-          <p:cNvSpPr txBox="1"/>
-          <p:nvPr/>
-        </p:nvSpPr>
-        <p:spPr>
-          <a:xfrm>
-            <a:off x="0" y="2582313"/>
-            <a:ext cx="9119944" cy="830997"/>
-          </a:xfrm>
-          <a:prstGeom prst="rect">
-            <a:avLst/>
-          </a:prstGeom>
-          <a:noFill/>
-        </p:spPr>
-        <p:txBody>
-          <a:bodyPr wrap="square" rtlCol="0">
-            <a:spAutoFit/>
-          </a:bodyPr>
-          <a:lstStyle/>
-          <a:p>
-            <a:pPr algn="ctr"/>
-            <a:r>
-              <a:rPr lang="de-DE" sz="4800" dirty="0"/>
-              <a:t>[…]</a:t>
-            </a:r>
-          </a:p>
-        </p:txBody>
-      </p:sp>
-      <p:pic>
-        <p:nvPicPr>
-          <p:cNvPr id="9" name="Grafik 8"/>
-          <p:cNvPicPr>
-            <a:picLocks noChangeAspect="1"/>
-          </p:cNvPicPr>
-          <p:nvPr/>
-        </p:nvPicPr>
-        <p:blipFill>
-          <a:blip r:embed="rId3" cstate="print">
-            <a:extLst>
-              <a:ext uri="{28A0092B-C50C-407E-A947-70E740481C1C}">
-                <a14:useLocalDpi xmlns:a14="http://schemas.microsoft.com/office/drawing/2010/main" val="0"/>
-              </a:ext>
-            </a:extLst>
-          </a:blip>
-          <a:stretch>
-            <a:fillRect/>
-          </a:stretch>
-        </p:blipFill>
-        <p:spPr>
-          <a:xfrm>
-            <a:off x="1286383" y="3485464"/>
-            <a:ext cx="9111916" cy="3021422"/>
-          </a:xfrm>
-          <a:prstGeom prst="rect">
-            <a:avLst/>
-          </a:prstGeom>
-        </p:spPr>
-      </p:pic>
-      <p:sp>
-        <p:nvSpPr>
-          <p:cNvPr id="10" name="Rechteck 9"/>
-          <p:cNvSpPr/>
-          <p:nvPr/>
-        </p:nvSpPr>
-        <p:spPr>
-          <a:xfrm>
-            <a:off x="4050637" y="16669"/>
-            <a:ext cx="456323" cy="147637"/>
-          </a:xfrm>
-          <a:prstGeom prst="rect">
-            <a:avLst/>
-          </a:prstGeom>
-          <a:noFill/>
-          <a:ln>
-            <a:solidFill>
-              <a:srgbClr val="FF0000"/>
-            </a:solidFill>
-          </a:ln>
-        </p:spPr>
-        <p:style>
-          <a:lnRef idx="2">
-            <a:schemeClr val="accent1">
-              <a:shade val="50000"/>
-            </a:schemeClr>
-          </a:lnRef>
-          <a:fillRef idx="1">
-            <a:schemeClr val="accent1"/>
-          </a:fillRef>
-          <a:effectRef idx="0">
-            <a:schemeClr val="accent1"/>
-          </a:effectRef>
-          <a:fontRef idx="minor">
-            <a:schemeClr val="lt1"/>
-          </a:fontRef>
-        </p:style>
-        <p:txBody>
-          <a:bodyPr rtlCol="0" anchor="ctr"/>
-          <a:lstStyle/>
-          <a:p>
-            <a:pPr algn="ctr"/>
-            <a:endParaRPr lang="de-DE" dirty="0"/>
-          </a:p>
-        </p:txBody>
-      </p:sp>
-      <p:cxnSp>
-        <p:nvCxnSpPr>
-          <p:cNvPr id="12" name="Gerade Verbindung mit Pfeil 11"/>
-          <p:cNvCxnSpPr/>
-          <p:nvPr/>
-        </p:nvCxnSpPr>
-        <p:spPr>
-          <a:xfrm flipH="1">
-            <a:off x="8543180" y="6038850"/>
-            <a:ext cx="576764" cy="0"/>
-          </a:xfrm>
-          <a:prstGeom prst="straightConnector1">
-            <a:avLst/>
-          </a:prstGeom>
-          <a:ln>
-            <a:solidFill>
-              <a:srgbClr val="FF0000"/>
-            </a:solidFill>
-            <a:tailEnd type="triangle"/>
-          </a:ln>
-        </p:spPr>
-        <p:style>
-          <a:lnRef idx="1">
-            <a:schemeClr val="accent1"/>
-          </a:lnRef>
-          <a:fillRef idx="0">
-            <a:schemeClr val="accent1"/>
-          </a:fillRef>
-          <a:effectRef idx="0">
-            <a:schemeClr val="accent1"/>
-          </a:effectRef>
-          <a:fontRef idx="minor">
-            <a:schemeClr val="tx1"/>
-          </a:fontRef>
-        </p:style>
-      </p:cxnSp>
-      <p:cxnSp>
-        <p:nvCxnSpPr>
-          <p:cNvPr id="13" name="Gerade Verbindung mit Pfeil 12"/>
-          <p:cNvCxnSpPr/>
-          <p:nvPr/>
-        </p:nvCxnSpPr>
-        <p:spPr>
-          <a:xfrm flipH="1">
-            <a:off x="8543180" y="5962644"/>
-            <a:ext cx="576764" cy="0"/>
-          </a:xfrm>
-          <a:prstGeom prst="straightConnector1">
-            <a:avLst/>
-          </a:prstGeom>
-          <a:ln>
-            <a:solidFill>
-              <a:srgbClr val="FF0000"/>
-            </a:solidFill>
-            <a:tailEnd type="triangle"/>
-          </a:ln>
-        </p:spPr>
-        <p:style>
-          <a:lnRef idx="1">
-            <a:schemeClr val="accent1"/>
-          </a:lnRef>
-          <a:fillRef idx="0">
-            <a:schemeClr val="accent1"/>
-          </a:fillRef>
-          <a:effectRef idx="0">
-            <a:schemeClr val="accent1"/>
-          </a:effectRef>
-          <a:fontRef idx="minor">
-            <a:schemeClr val="tx1"/>
-          </a:fontRef>
-        </p:style>
-      </p:cxnSp>
-      <p:cxnSp>
-        <p:nvCxnSpPr>
-          <p:cNvPr id="14" name="Gerade Verbindung mit Pfeil 13"/>
-          <p:cNvCxnSpPr/>
-          <p:nvPr/>
-        </p:nvCxnSpPr>
-        <p:spPr>
-          <a:xfrm flipH="1">
-            <a:off x="7459709" y="4086218"/>
-            <a:ext cx="576764" cy="0"/>
-          </a:xfrm>
-          <a:prstGeom prst="straightConnector1">
-            <a:avLst/>
-          </a:prstGeom>
-          <a:ln>
-            <a:solidFill>
-              <a:srgbClr val="FF0000"/>
-            </a:solidFill>
-            <a:tailEnd type="triangle"/>
-          </a:ln>
-        </p:spPr>
-        <p:style>
-          <a:lnRef idx="1">
-            <a:schemeClr val="accent1"/>
-          </a:lnRef>
-          <a:fillRef idx="0">
-            <a:schemeClr val="accent1"/>
-          </a:fillRef>
-          <a:effectRef idx="0">
-            <a:schemeClr val="accent1"/>
-          </a:effectRef>
-          <a:fontRef idx="minor">
-            <a:schemeClr val="tx1"/>
-          </a:fontRef>
-        </p:style>
-      </p:cxnSp>
-      <p:sp>
-        <p:nvSpPr>
-          <p:cNvPr id="15" name="Textfeld 14"/>
-          <p:cNvSpPr txBox="1"/>
-          <p:nvPr/>
-        </p:nvSpPr>
-        <p:spPr>
-          <a:xfrm>
-            <a:off x="8560060" y="816185"/>
-            <a:ext cx="3487554" cy="2308324"/>
-          </a:xfrm>
-          <a:prstGeom prst="rect">
-            <a:avLst/>
-          </a:prstGeom>
-          <a:noFill/>
-        </p:spPr>
-        <p:txBody>
-          <a:bodyPr wrap="square" rtlCol="0">
-            <a:spAutoFit/>
-          </a:bodyPr>
-          <a:lstStyle/>
-          <a:p>
-            <a:pPr marL="285750" indent="-285750">
-              <a:buFont typeface="Arial" panose="020B0604020202020204" pitchFamily="34" charset="0"/>
-              <a:buChar char="•"/>
-            </a:pPr>
-            <a:r>
-              <a:rPr lang="en-US" sz="2400" dirty="0"/>
-              <a:t>Phylogenetic tree of 206 modern humans and 2 </a:t>
-            </a:r>
-            <a:r>
-              <a:rPr lang="en-US" sz="2400" dirty="0" err="1"/>
-              <a:t>neanderthals</a:t>
-            </a:r>
-            <a:endParaRPr lang="en-US" sz="2400" dirty="0"/>
-          </a:p>
-          <a:p>
-            <a:pPr marL="285750" indent="-285750">
-              <a:buFont typeface="Arial" panose="020B0604020202020204" pitchFamily="34" charset="0"/>
-              <a:buChar char="•"/>
-            </a:pPr>
-            <a:r>
-              <a:rPr lang="en-US" sz="2400" dirty="0" err="1"/>
-              <a:t>neanderthals</a:t>
-            </a:r>
-            <a:r>
-              <a:rPr lang="en-US" sz="2400" dirty="0"/>
-              <a:t> are genetically distant from modern humans</a:t>
-            </a:r>
-            <a:endParaRPr lang="de-DE" sz="2400" dirty="0"/>
-          </a:p>
-        </p:txBody>
-      </p:sp>
-      <p:pic>
-        <p:nvPicPr>
-          <p:cNvPr id="16" name="Grafik 15"/>
-          <p:cNvPicPr>
-            <a:picLocks noChangeAspect="1"/>
-          </p:cNvPicPr>
-          <p:nvPr/>
-        </p:nvPicPr>
-        <p:blipFill>
-          <a:blip r:embed="rId4" cstate="print">
-            <a:extLst>
-              <a:ext uri="{28A0092B-C50C-407E-A947-70E740481C1C}">
-                <a14:useLocalDpi xmlns:a14="http://schemas.microsoft.com/office/drawing/2010/main" val="0"/>
-              </a:ext>
-            </a:extLst>
-          </a:blip>
-          <a:stretch>
-            <a:fillRect/>
-          </a:stretch>
-        </p:blipFill>
-        <p:spPr>
-          <a:xfrm>
-            <a:off x="0" y="4942726"/>
-            <a:ext cx="1664404" cy="1915274"/>
-          </a:xfrm>
-          <a:prstGeom prst="rect">
-            <a:avLst/>
-          </a:prstGeom>
-          <a:ln w="28575">
-            <a:solidFill>
-              <a:schemeClr val="tx1"/>
-            </a:solidFill>
-          </a:ln>
-        </p:spPr>
-      </p:pic>
-      <p:sp>
-        <p:nvSpPr>
-          <p:cNvPr id="17" name="Rechteck 16"/>
-          <p:cNvSpPr/>
-          <p:nvPr/>
-        </p:nvSpPr>
-        <p:spPr>
-          <a:xfrm>
-            <a:off x="-19050" y="4932885"/>
-            <a:ext cx="1700213" cy="370159"/>
-          </a:xfrm>
-          <a:prstGeom prst="rect">
-            <a:avLst/>
-          </a:prstGeom>
-          <a:noFill/>
-          <a:ln w="6350">
-            <a:solidFill>
-              <a:schemeClr val="tx1"/>
-            </a:solidFill>
-            <a:prstDash val="sysDash"/>
-          </a:ln>
-        </p:spPr>
-        <p:style>
-          <a:lnRef idx="2">
-            <a:schemeClr val="accent1">
-              <a:shade val="50000"/>
-            </a:schemeClr>
-          </a:lnRef>
-          <a:fillRef idx="1">
-            <a:schemeClr val="accent1"/>
-          </a:fillRef>
-          <a:effectRef idx="0">
-            <a:schemeClr val="accent1"/>
-          </a:effectRef>
-          <a:fontRef idx="minor">
-            <a:schemeClr val="lt1"/>
-          </a:fontRef>
-        </p:style>
-        <p:txBody>
-          <a:bodyPr rtlCol="0" anchor="ctr"/>
-          <a:lstStyle/>
-          <a:p>
-            <a:pPr algn="ctr"/>
-            <a:endParaRPr lang="de-DE"/>
-          </a:p>
-        </p:txBody>
-      </p:sp>
-      <p:sp>
-        <p:nvSpPr>
-          <p:cNvPr id="18" name="Rechteck 17"/>
-          <p:cNvSpPr/>
-          <p:nvPr/>
-        </p:nvSpPr>
-        <p:spPr>
-          <a:xfrm>
-            <a:off x="0" y="6390147"/>
-            <a:ext cx="1664404" cy="477694"/>
-          </a:xfrm>
-          <a:prstGeom prst="rect">
-            <a:avLst/>
-          </a:prstGeom>
-          <a:noFill/>
-          <a:ln w="6350">
-            <a:solidFill>
-              <a:schemeClr val="tx1"/>
-            </a:solidFill>
-            <a:prstDash val="sysDash"/>
-          </a:ln>
-        </p:spPr>
-        <p:style>
-          <a:lnRef idx="2">
-            <a:schemeClr val="accent1">
-              <a:shade val="50000"/>
-            </a:schemeClr>
-          </a:lnRef>
-          <a:fillRef idx="1">
-            <a:schemeClr val="accent1"/>
-          </a:fillRef>
-          <a:effectRef idx="0">
-            <a:schemeClr val="accent1"/>
-          </a:effectRef>
-          <a:fontRef idx="minor">
-            <a:schemeClr val="lt1"/>
-          </a:fontRef>
-        </p:style>
-        <p:txBody>
-          <a:bodyPr rtlCol="0" anchor="ctr"/>
-          <a:lstStyle/>
-          <a:p>
-            <a:pPr algn="ctr"/>
-            <a:endParaRPr lang="de-DE"/>
-          </a:p>
-        </p:txBody>
-      </p:sp>
     </p:spTree>
     <p:extLst>
       <p:ext uri="{BB962C8B-B14F-4D97-AF65-F5344CB8AC3E}">
-        <p14:creationId xmlns:p14="http://schemas.microsoft.com/office/powerpoint/2010/main" val="2928616866"/>
+        <p14:creationId xmlns:p14="http://schemas.microsoft.com/office/powerpoint/2010/main" val="1077453744"/>
       </p:ext>
     </p:extLst>
   </p:cSld>
@@ -4720,14 +4324,14 @@
       </p:grpSpPr>
       <p:pic>
         <p:nvPicPr>
-          <p:cNvPr id="4" name="Grafik 3"/>
+          <p:cNvPr id="7" name="Grafik 6"/>
           <p:cNvPicPr>
             <a:picLocks noChangeAspect="1"/>
           </p:cNvPicPr>
           <p:nvPr/>
         </p:nvPicPr>
         <p:blipFill>
-          <a:blip r:embed="rId2">
+          <a:blip r:embed="rId2" cstate="print">
             <a:extLst>
               <a:ext uri="{28A0092B-C50C-407E-A947-70E740481C1C}">
                 <a14:useLocalDpi xmlns:a14="http://schemas.microsoft.com/office/drawing/2010/main" val="0"/>
@@ -4740,18 +4344,414 @@
         </p:blipFill>
         <p:spPr>
           <a:xfrm>
-            <a:off x="944880" y="244230"/>
-            <a:ext cx="9742535" cy="6369540"/>
+            <a:off x="144386" y="-32085"/>
+            <a:ext cx="8975558" cy="2763527"/>
           </a:xfrm>
           <a:prstGeom prst="rect">
             <a:avLst/>
           </a:prstGeom>
         </p:spPr>
       </p:pic>
+      <p:sp>
+        <p:nvSpPr>
+          <p:cNvPr id="8" name="Textfeld 7"/>
+          <p:cNvSpPr txBox="1"/>
+          <p:nvPr/>
+        </p:nvSpPr>
+        <p:spPr>
+          <a:xfrm>
+            <a:off x="0" y="2582313"/>
+            <a:ext cx="9119944" cy="830997"/>
+          </a:xfrm>
+          <a:prstGeom prst="rect">
+            <a:avLst/>
+          </a:prstGeom>
+          <a:noFill/>
+        </p:spPr>
+        <p:txBody>
+          <a:bodyPr wrap="square" rtlCol="0">
+            <a:spAutoFit/>
+          </a:bodyPr>
+          <a:lstStyle/>
+          <a:p>
+            <a:pPr algn="ctr"/>
+            <a:r>
+              <a:rPr lang="de-DE" sz="4800" dirty="0"/>
+              <a:t>[…]</a:t>
+            </a:r>
+          </a:p>
+        </p:txBody>
+      </p:sp>
+      <p:pic>
+        <p:nvPicPr>
+          <p:cNvPr id="9" name="Grafik 8"/>
+          <p:cNvPicPr>
+            <a:picLocks noChangeAspect="1"/>
+          </p:cNvPicPr>
+          <p:nvPr/>
+        </p:nvPicPr>
+        <p:blipFill>
+          <a:blip r:embed="rId3" cstate="print">
+            <a:extLst>
+              <a:ext uri="{28A0092B-C50C-407E-A947-70E740481C1C}">
+                <a14:useLocalDpi xmlns:a14="http://schemas.microsoft.com/office/drawing/2010/main" val="0"/>
+              </a:ext>
+            </a:extLst>
+          </a:blip>
+          <a:stretch>
+            <a:fillRect/>
+          </a:stretch>
+        </p:blipFill>
+        <p:spPr>
+          <a:xfrm>
+            <a:off x="1286383" y="3485464"/>
+            <a:ext cx="9111916" cy="3021422"/>
+          </a:xfrm>
+          <a:prstGeom prst="rect">
+            <a:avLst/>
+          </a:prstGeom>
+        </p:spPr>
+      </p:pic>
+      <p:sp>
+        <p:nvSpPr>
+          <p:cNvPr id="10" name="Rechteck 9"/>
+          <p:cNvSpPr/>
+          <p:nvPr/>
+        </p:nvSpPr>
+        <p:spPr>
+          <a:xfrm>
+            <a:off x="4050637" y="16669"/>
+            <a:ext cx="456323" cy="147637"/>
+          </a:xfrm>
+          <a:prstGeom prst="rect">
+            <a:avLst/>
+          </a:prstGeom>
+          <a:noFill/>
+          <a:ln>
+            <a:solidFill>
+              <a:srgbClr val="FF0000"/>
+            </a:solidFill>
+          </a:ln>
+        </p:spPr>
+        <p:style>
+          <a:lnRef idx="2">
+            <a:schemeClr val="accent1">
+              <a:shade val="50000"/>
+            </a:schemeClr>
+          </a:lnRef>
+          <a:fillRef idx="1">
+            <a:schemeClr val="accent1"/>
+          </a:fillRef>
+          <a:effectRef idx="0">
+            <a:schemeClr val="accent1"/>
+          </a:effectRef>
+          <a:fontRef idx="minor">
+            <a:schemeClr val="lt1"/>
+          </a:fontRef>
+        </p:style>
+        <p:txBody>
+          <a:bodyPr rtlCol="0" anchor="ctr"/>
+          <a:lstStyle/>
+          <a:p>
+            <a:pPr algn="ctr"/>
+            <a:endParaRPr lang="de-DE" dirty="0"/>
+          </a:p>
+        </p:txBody>
+      </p:sp>
+      <p:cxnSp>
+        <p:nvCxnSpPr>
+          <p:cNvPr id="12" name="Gerade Verbindung mit Pfeil 11"/>
+          <p:cNvCxnSpPr/>
+          <p:nvPr/>
+        </p:nvCxnSpPr>
+        <p:spPr>
+          <a:xfrm flipH="1">
+            <a:off x="8543180" y="6038850"/>
+            <a:ext cx="576764" cy="0"/>
+          </a:xfrm>
+          <a:prstGeom prst="straightConnector1">
+            <a:avLst/>
+          </a:prstGeom>
+          <a:ln>
+            <a:solidFill>
+              <a:srgbClr val="FF0000"/>
+            </a:solidFill>
+            <a:tailEnd type="triangle"/>
+          </a:ln>
+        </p:spPr>
+        <p:style>
+          <a:lnRef idx="1">
+            <a:schemeClr val="accent1"/>
+          </a:lnRef>
+          <a:fillRef idx="0">
+            <a:schemeClr val="accent1"/>
+          </a:fillRef>
+          <a:effectRef idx="0">
+            <a:schemeClr val="accent1"/>
+          </a:effectRef>
+          <a:fontRef idx="minor">
+            <a:schemeClr val="tx1"/>
+          </a:fontRef>
+        </p:style>
+      </p:cxnSp>
+      <p:cxnSp>
+        <p:nvCxnSpPr>
+          <p:cNvPr id="13" name="Gerade Verbindung mit Pfeil 12"/>
+          <p:cNvCxnSpPr/>
+          <p:nvPr/>
+        </p:nvCxnSpPr>
+        <p:spPr>
+          <a:xfrm flipH="1">
+            <a:off x="8543180" y="5962644"/>
+            <a:ext cx="576764" cy="0"/>
+          </a:xfrm>
+          <a:prstGeom prst="straightConnector1">
+            <a:avLst/>
+          </a:prstGeom>
+          <a:ln>
+            <a:solidFill>
+              <a:srgbClr val="FF0000"/>
+            </a:solidFill>
+            <a:tailEnd type="triangle"/>
+          </a:ln>
+        </p:spPr>
+        <p:style>
+          <a:lnRef idx="1">
+            <a:schemeClr val="accent1"/>
+          </a:lnRef>
+          <a:fillRef idx="0">
+            <a:schemeClr val="accent1"/>
+          </a:fillRef>
+          <a:effectRef idx="0">
+            <a:schemeClr val="accent1"/>
+          </a:effectRef>
+          <a:fontRef idx="minor">
+            <a:schemeClr val="tx1"/>
+          </a:fontRef>
+        </p:style>
+      </p:cxnSp>
+      <p:cxnSp>
+        <p:nvCxnSpPr>
+          <p:cNvPr id="14" name="Gerade Verbindung mit Pfeil 13"/>
+          <p:cNvCxnSpPr/>
+          <p:nvPr/>
+        </p:nvCxnSpPr>
+        <p:spPr>
+          <a:xfrm flipH="1">
+            <a:off x="7459709" y="4086218"/>
+            <a:ext cx="576764" cy="0"/>
+          </a:xfrm>
+          <a:prstGeom prst="straightConnector1">
+            <a:avLst/>
+          </a:prstGeom>
+          <a:ln>
+            <a:solidFill>
+              <a:srgbClr val="FF0000"/>
+            </a:solidFill>
+            <a:tailEnd type="triangle"/>
+          </a:ln>
+        </p:spPr>
+        <p:style>
+          <a:lnRef idx="1">
+            <a:schemeClr val="accent1"/>
+          </a:lnRef>
+          <a:fillRef idx="0">
+            <a:schemeClr val="accent1"/>
+          </a:fillRef>
+          <a:effectRef idx="0">
+            <a:schemeClr val="accent1"/>
+          </a:effectRef>
+          <a:fontRef idx="minor">
+            <a:schemeClr val="tx1"/>
+          </a:fontRef>
+        </p:style>
+      </p:cxnSp>
+      <p:sp>
+        <p:nvSpPr>
+          <p:cNvPr id="15" name="Textfeld 14"/>
+          <p:cNvSpPr txBox="1"/>
+          <p:nvPr/>
+        </p:nvSpPr>
+        <p:spPr>
+          <a:xfrm>
+            <a:off x="8560060" y="816185"/>
+            <a:ext cx="3487554" cy="2308324"/>
+          </a:xfrm>
+          <a:prstGeom prst="rect">
+            <a:avLst/>
+          </a:prstGeom>
+          <a:noFill/>
+        </p:spPr>
+        <p:txBody>
+          <a:bodyPr wrap="square" rtlCol="0">
+            <a:spAutoFit/>
+          </a:bodyPr>
+          <a:lstStyle/>
+          <a:p>
+            <a:pPr marL="285750" indent="-285750">
+              <a:buFont typeface="Arial" panose="020B0604020202020204" pitchFamily="34" charset="0"/>
+              <a:buChar char="•"/>
+            </a:pPr>
+            <a:r>
+              <a:rPr lang="en-US" sz="2400" dirty="0"/>
+              <a:t>Phylogenetic tree of 206 modern humans and 2 </a:t>
+            </a:r>
+            <a:r>
+              <a:rPr lang="en-US" sz="2400" dirty="0" err="1"/>
+              <a:t>neanderthals</a:t>
+            </a:r>
+            <a:endParaRPr lang="en-US" sz="2400" dirty="0"/>
+          </a:p>
+          <a:p>
+            <a:pPr marL="285750" indent="-285750">
+              <a:buFont typeface="Arial" panose="020B0604020202020204" pitchFamily="34" charset="0"/>
+              <a:buChar char="•"/>
+            </a:pPr>
+            <a:r>
+              <a:rPr lang="en-US" sz="2400" dirty="0" err="1"/>
+              <a:t>neanderthals</a:t>
+            </a:r>
+            <a:r>
+              <a:rPr lang="en-US" sz="2400" dirty="0"/>
+              <a:t> are genetically distant from modern humans</a:t>
+            </a:r>
+            <a:endParaRPr lang="de-DE" sz="2400" dirty="0"/>
+          </a:p>
+        </p:txBody>
+      </p:sp>
+      <p:pic>
+        <p:nvPicPr>
+          <p:cNvPr id="16" name="Grafik 15"/>
+          <p:cNvPicPr>
+            <a:picLocks noChangeAspect="1"/>
+          </p:cNvPicPr>
+          <p:nvPr/>
+        </p:nvPicPr>
+        <p:blipFill>
+          <a:blip r:embed="rId4" cstate="print">
+            <a:extLst>
+              <a:ext uri="{28A0092B-C50C-407E-A947-70E740481C1C}">
+                <a14:useLocalDpi xmlns:a14="http://schemas.microsoft.com/office/drawing/2010/main" val="0"/>
+              </a:ext>
+            </a:extLst>
+          </a:blip>
+          <a:stretch>
+            <a:fillRect/>
+          </a:stretch>
+        </p:blipFill>
+        <p:spPr>
+          <a:xfrm>
+            <a:off x="0" y="4942726"/>
+            <a:ext cx="1664404" cy="1915274"/>
+          </a:xfrm>
+          <a:prstGeom prst="rect">
+            <a:avLst/>
+          </a:prstGeom>
+          <a:ln w="28575">
+            <a:solidFill>
+              <a:schemeClr val="tx1"/>
+            </a:solidFill>
+          </a:ln>
+        </p:spPr>
+      </p:pic>
+      <p:sp>
+        <p:nvSpPr>
+          <p:cNvPr id="17" name="Rechteck 16"/>
+          <p:cNvSpPr/>
+          <p:nvPr/>
+        </p:nvSpPr>
+        <p:spPr>
+          <a:xfrm>
+            <a:off x="-19050" y="4932885"/>
+            <a:ext cx="1700213" cy="370159"/>
+          </a:xfrm>
+          <a:prstGeom prst="rect">
+            <a:avLst/>
+          </a:prstGeom>
+          <a:noFill/>
+          <a:ln w="6350">
+            <a:solidFill>
+              <a:schemeClr val="tx1"/>
+            </a:solidFill>
+            <a:prstDash val="sysDash"/>
+          </a:ln>
+        </p:spPr>
+        <p:style>
+          <a:lnRef idx="2">
+            <a:schemeClr val="accent1">
+              <a:shade val="50000"/>
+            </a:schemeClr>
+          </a:lnRef>
+          <a:fillRef idx="1">
+            <a:schemeClr val="accent1"/>
+          </a:fillRef>
+          <a:effectRef idx="0">
+            <a:schemeClr val="accent1"/>
+          </a:effectRef>
+          <a:fontRef idx="minor">
+            <a:schemeClr val="lt1"/>
+          </a:fontRef>
+        </p:style>
+        <p:txBody>
+          <a:bodyPr rtlCol="0" anchor="ctr"/>
+          <a:lstStyle/>
+          <a:p>
+            <a:pPr algn="ctr"/>
+            <a:endParaRPr lang="de-DE"/>
+          </a:p>
+        </p:txBody>
+      </p:sp>
+      <p:sp>
+        <p:nvSpPr>
+          <p:cNvPr id="18" name="Rechteck 17"/>
+          <p:cNvSpPr/>
+          <p:nvPr/>
+        </p:nvSpPr>
+        <p:spPr>
+          <a:xfrm>
+            <a:off x="0" y="6390147"/>
+            <a:ext cx="1664404" cy="477694"/>
+          </a:xfrm>
+          <a:prstGeom prst="rect">
+            <a:avLst/>
+          </a:prstGeom>
+          <a:noFill/>
+          <a:ln w="6350">
+            <a:solidFill>
+              <a:schemeClr val="tx1"/>
+            </a:solidFill>
+            <a:prstDash val="sysDash"/>
+          </a:ln>
+        </p:spPr>
+        <p:style>
+          <a:lnRef idx="2">
+            <a:schemeClr val="accent1">
+              <a:shade val="50000"/>
+            </a:schemeClr>
+          </a:lnRef>
+          <a:fillRef idx="1">
+            <a:schemeClr val="accent1"/>
+          </a:fillRef>
+          <a:effectRef idx="0">
+            <a:schemeClr val="accent1"/>
+          </a:effectRef>
+          <a:fontRef idx="minor">
+            <a:schemeClr val="lt1"/>
+          </a:fontRef>
+        </p:style>
+        <p:txBody>
+          <a:bodyPr rtlCol="0" anchor="ctr"/>
+          <a:lstStyle/>
+          <a:p>
+            <a:pPr algn="ctr"/>
+            <a:endParaRPr lang="de-DE"/>
+          </a:p>
+        </p:txBody>
+      </p:sp>
     </p:spTree>
     <p:extLst>
       <p:ext uri="{BB962C8B-B14F-4D97-AF65-F5344CB8AC3E}">
-        <p14:creationId xmlns:p14="http://schemas.microsoft.com/office/powerpoint/2010/main" val="1077453744"/>
+        <p14:creationId xmlns:p14="http://schemas.microsoft.com/office/powerpoint/2010/main" val="2928616866"/>
       </p:ext>
     </p:extLst>
   </p:cSld>
@@ -5393,13 +5393,13 @@
               <a:t> Picture: </a:t>
             </a:r>
             <a:r>
-              <a:rPr lang="en-GB" b="1" i="1" dirty="0">
+              <a:rPr lang="en-GB" i="1" dirty="0">
                 <a:hlinkClick r:id="rId6"/>
               </a:rPr>
               <a:t>Emmanuel </a:t>
             </a:r>
             <a:r>
-              <a:rPr lang="en-GB" b="1" i="1" dirty="0" err="1">
+              <a:rPr lang="en-GB" i="1" dirty="0" err="1">
                 <a:hlinkClick r:id="rId6"/>
               </a:rPr>
               <a:t>Douzery</a:t>
@@ -6407,7 +6407,7 @@
         <p:spPr>
           <a:xfrm>
             <a:off x="710058" y="1463675"/>
-            <a:ext cx="5945659" cy="4955203"/>
+            <a:ext cx="5945659" cy="4401205"/>
           </a:xfrm>
           <a:prstGeom prst="rect">
             <a:avLst/>
@@ -6452,31 +6452,18 @@
               </a:lnSpc>
             </a:pPr>
             <a:r>
-              <a:rPr lang="en-GB" sz="2400" dirty="0"/>
+              <a:rPr lang="en-GB" sz="2800" dirty="0"/>
               <a:t>	</a:t>
             </a:r>
             <a:r>
-              <a:rPr lang="en-GB" sz="2400" dirty="0">
+              <a:rPr lang="en-GB" sz="2800" dirty="0">
                 <a:sym typeface="Wingdings" panose="05000000000000000000" pitchFamily="2" charset="2"/>
               </a:rPr>
               <a:t> </a:t>
             </a:r>
             <a:r>
-              <a:rPr lang="en-GB" sz="2400" dirty="0"/>
+              <a:rPr lang="en-GB" sz="2800" dirty="0"/>
               <a:t>No recombination </a:t>
-            </a:r>
-          </a:p>
-          <a:p>
-            <a:pPr>
-              <a:lnSpc>
-                <a:spcPct val="150000"/>
-              </a:lnSpc>
-            </a:pPr>
-            <a:r>
-              <a:rPr lang="en-GB" sz="2400" dirty="0">
-                <a:sym typeface="Wingdings" panose="05000000000000000000" pitchFamily="2" charset="2"/>
-              </a:rPr>
-              <a:t>	 mutations only through evolution</a:t>
             </a:r>
           </a:p>
           <a:p>
@@ -7056,7 +7043,7 @@
         <p:spPr>
           <a:xfrm>
             <a:off x="8010268" y="4552109"/>
-            <a:ext cx="3190104" cy="1754326"/>
+            <a:ext cx="3190104" cy="1200329"/>
           </a:xfrm>
           <a:prstGeom prst="rect">
             <a:avLst/>
@@ -7071,7 +7058,7 @@
           <a:p>
             <a:r>
               <a:rPr lang="en-GB" sz="3600" dirty="0"/>
-              <a:t>Deduce relatedness and geneflow</a:t>
+              <a:t>Deduce relatedness</a:t>
             </a:r>
           </a:p>
         </p:txBody>

</xml_diff>